<commit_message>
Presentación con más de 2 preguntas
</commit_message>
<xml_diff>
--- a/sistemaaid/backend/ia/presentaciones/pruebapresentaciones.pptx
+++ b/sistemaaid/backend/ia/presentaciones/pruebapresentaciones.pptx
@@ -6,7 +6,8 @@
   </p:sldMasterIdLst>
   <p:sldIdLst>
     <p:sldId id="256" r:id="rId2"/>
-    <p:sldId id="257" r:id="rId7"/>
+    <p:sldId id="257" r:id="rId3"/>
+    <p:sldId id="258" r:id="rId4"/>
   </p:sldIdLst>
   <p:sldSz cx="12192000" cy="6858000"/>
   <p:notesSz cx="6858000" cy="9144000"/>
@@ -114,14 +115,23 @@
 </file>
 
 <file path=ppt/charts/chart1.xml><?xml version="1.0" encoding="utf-8"?>
-<c:chartSpace xmlns:c="http://schemas.openxmlformats.org/drawingml/2006/chart" xmlns:a="http://schemas.openxmlformats.org/drawingml/2006/main" xmlns:r="http://schemas.openxmlformats.org/officeDocument/2006/relationships">
+<c:chartSpace xmlns:c="http://schemas.openxmlformats.org/drawingml/2006/chart" xmlns:a="http://schemas.openxmlformats.org/drawingml/2006/main" xmlns:r="http://schemas.openxmlformats.org/officeDocument/2006/relationships" xmlns:c16r2="http://schemas.microsoft.com/office/drawing/2015/06/chart">
   <c:date1904 val="0"/>
+  <c:lang val="es-ES"/>
+  <c:roundedCorners val="1"/>
+  <c:style val="2"/>
   <c:chart>
+    <c:title>
+      <c:layout/>
+      <c:overlay val="0"/>
+    </c:title>
     <c:autoTitleDeleted val="0"/>
     <c:plotArea>
+      <c:layout/>
       <c:barChart>
         <c:barDir val="col"/>
         <c:grouping val="clustered"/>
+        <c:varyColors val="1"/>
         <c:ser>
           <c:idx val="0"/>
           <c:order val="0"/>
@@ -136,6 +146,7 @@
               </c:strCache>
             </c:strRef>
           </c:tx>
+          <c:invertIfNegative val="1"/>
           <c:cat>
             <c:strRef>
               <c:f>Sheet1!$A$2:$A$7</c:f>
@@ -189,7 +200,21 @@
               </c:numCache>
             </c:numRef>
           </c:val>
+          <c:extLst>
+            <c:ext xmlns:c16="http://schemas.microsoft.com/office/drawing/2014/chart" uri="{C3380CC4-5D6E-409C-BE32-E72D297353CC}">
+              <c16:uniqueId val="{00000000-C04F-4160-B13A-BAC1E5DD0ED2}"/>
+            </c:ext>
+          </c:extLst>
         </c:ser>
+        <c:dLbls>
+          <c:showLegendKey val="0"/>
+          <c:showVal val="0"/>
+          <c:showCatName val="0"/>
+          <c:showSerName val="0"/>
+          <c:showPercent val="0"/>
+          <c:showBubbleSize val="0"/>
+        </c:dLbls>
+        <c:gapWidth val="150"/>
         <c:axId val="-2068027336"/>
         <c:axId val="-2113994440"/>
       </c:barChart>
@@ -200,6 +225,7 @@
         </c:scaling>
         <c:delete val="0"/>
         <c:axPos val="b"/>
+        <c:numFmt formatCode="General" sourceLinked="0"/>
         <c:majorTickMark val="out"/>
         <c:minorTickMark val="none"/>
         <c:tickLblPos val="nextTo"/>
@@ -212,18 +238,189 @@
       </c:catAx>
       <c:valAx>
         <c:axId val="-2113994440"/>
-        <c:scaling/>
+        <c:scaling>
+          <c:orientation val="minMax"/>
+        </c:scaling>
         <c:delete val="0"/>
         <c:axPos val="l"/>
         <c:majorGridlines/>
+        <c:numFmt formatCode="General" sourceLinked="1"/>
         <c:majorTickMark val="out"/>
         <c:minorTickMark val="none"/>
         <c:tickLblPos val="nextTo"/>
         <c:crossAx val="-2068027336"/>
         <c:crosses val="autoZero"/>
+        <c:crossBetween val="between"/>
       </c:valAx>
     </c:plotArea>
+    <c:plotVisOnly val="1"/>
     <c:dispBlanksAs val="gap"/>
+    <c:showDLblsOverMax val="1"/>
+  </c:chart>
+  <c:txPr>
+    <a:bodyPr/>
+    <a:lstStyle/>
+    <a:p>
+      <a:pPr>
+        <a:defRPr sz="1800"/>
+      </a:pPr>
+      <a:endParaRPr lang="en-US"/>
+    </a:p>
+  </c:txPr>
+  <c:externalData r:id="rId1">
+    <c:autoUpdate val="0"/>
+  </c:externalData>
+</c:chartSpace>
+</file>
+
+<file path=ppt/charts/chart2.xml><?xml version="1.0" encoding="utf-8"?>
+<c:chartSpace xmlns:c="http://schemas.openxmlformats.org/drawingml/2006/chart" xmlns:a="http://schemas.openxmlformats.org/drawingml/2006/main" xmlns:r="http://schemas.openxmlformats.org/officeDocument/2006/relationships" xmlns:c16r2="http://schemas.microsoft.com/office/drawing/2015/06/chart">
+  <c:date1904 val="0"/>
+  <c:lang val="es-ES"/>
+  <c:roundedCorners val="1"/>
+  <c:style val="2"/>
+  <c:chart>
+    <c:title>
+      <c:layout/>
+      <c:overlay val="0"/>
+    </c:title>
+    <c:autoTitleDeleted val="0"/>
+    <c:plotArea>
+      <c:layout/>
+      <c:barChart>
+        <c:barDir val="col"/>
+        <c:grouping val="clustered"/>
+        <c:varyColors val="1"/>
+        <c:ser>
+          <c:idx val="0"/>
+          <c:order val="0"/>
+          <c:tx>
+            <c:strRef>
+              <c:f>Sheet1!$B$1</c:f>
+              <c:strCache>
+                <c:ptCount val="1"/>
+                <c:pt idx="0">
+                  <c:v>Series 1</c:v>
+                </c:pt>
+              </c:strCache>
+            </c:strRef>
+          </c:tx>
+          <c:invertIfNegative val="1"/>
+          <c:cat>
+            <c:strRef>
+              <c:f>Sheet1!$A$2:$A$8</c:f>
+              <c:strCache>
+                <c:ptCount val="7"/>
+                <c:pt idx="0">
+                  <c:v>1.0</c:v>
+                </c:pt>
+                <c:pt idx="1">
+                  <c:v>2.0</c:v>
+                </c:pt>
+                <c:pt idx="2">
+                  <c:v>3.0</c:v>
+                </c:pt>
+                <c:pt idx="3">
+                  <c:v>4.0</c:v>
+                </c:pt>
+                <c:pt idx="4">
+                  <c:v>5.0</c:v>
+                </c:pt>
+                <c:pt idx="5">
+                  <c:v>6.0</c:v>
+                </c:pt>
+                <c:pt idx="6">
+                  <c:v>nan</c:v>
+                </c:pt>
+              </c:strCache>
+            </c:strRef>
+          </c:cat>
+          <c:val>
+            <c:numRef>
+              <c:f>Sheet1!$B$2:$B$8</c:f>
+              <c:numCache>
+                <c:formatCode>General</c:formatCode>
+                <c:ptCount val="7"/>
+                <c:pt idx="0">
+                  <c:v>22</c:v>
+                </c:pt>
+                <c:pt idx="1">
+                  <c:v>34</c:v>
+                </c:pt>
+                <c:pt idx="2">
+                  <c:v>78</c:v>
+                </c:pt>
+                <c:pt idx="3">
+                  <c:v>406</c:v>
+                </c:pt>
+                <c:pt idx="4">
+                  <c:v>400</c:v>
+                </c:pt>
+                <c:pt idx="5">
+                  <c:v>249</c:v>
+                </c:pt>
+                <c:pt idx="6">
+                  <c:v>109</c:v>
+                </c:pt>
+              </c:numCache>
+            </c:numRef>
+          </c:val>
+          <c:extLst>
+            <c:ext xmlns:c16="http://schemas.microsoft.com/office/drawing/2014/chart" uri="{C3380CC4-5D6E-409C-BE32-E72D297353CC}">
+              <c16:uniqueId val="{00000000-DA86-48C8-A57F-3C3251FAD3F6}"/>
+            </c:ext>
+          </c:extLst>
+        </c:ser>
+        <c:dLbls>
+          <c:showLegendKey val="0"/>
+          <c:showVal val="0"/>
+          <c:showCatName val="0"/>
+          <c:showSerName val="0"/>
+          <c:showPercent val="0"/>
+          <c:showBubbleSize val="0"/>
+        </c:dLbls>
+        <c:gapWidth val="150"/>
+        <c:axId val="-2068027336"/>
+        <c:axId val="-2113994440"/>
+      </c:barChart>
+      <c:catAx>
+        <c:axId val="-2068027336"/>
+        <c:scaling>
+          <c:orientation val="minMax"/>
+        </c:scaling>
+        <c:delete val="0"/>
+        <c:axPos val="b"/>
+        <c:numFmt formatCode="General" sourceLinked="0"/>
+        <c:majorTickMark val="out"/>
+        <c:minorTickMark val="none"/>
+        <c:tickLblPos val="nextTo"/>
+        <c:crossAx val="-2113994440"/>
+        <c:crosses val="autoZero"/>
+        <c:auto val="1"/>
+        <c:lblAlgn val="ctr"/>
+        <c:lblOffset val="100"/>
+        <c:noMultiLvlLbl val="0"/>
+      </c:catAx>
+      <c:valAx>
+        <c:axId val="-2113994440"/>
+        <c:scaling>
+          <c:orientation val="minMax"/>
+        </c:scaling>
+        <c:delete val="0"/>
+        <c:axPos val="l"/>
+        <c:majorGridlines/>
+        <c:numFmt formatCode="General" sourceLinked="1"/>
+        <c:majorTickMark val="out"/>
+        <c:minorTickMark val="none"/>
+        <c:tickLblPos val="nextTo"/>
+        <c:crossAx val="-2068027336"/>
+        <c:crosses val="autoZero"/>
+        <c:crossBetween val="between"/>
+      </c:valAx>
+    </c:plotArea>
+    <c:plotVisOnly val="1"/>
+    <c:dispBlanksAs val="gap"/>
+    <c:showDLblsOverMax val="1"/>
   </c:chart>
   <c:txPr>
     <a:bodyPr/>
@@ -3154,7 +3351,7 @@
 </file>
 
 <file path=ppt/slides/slide2.xml><?xml version="1.0" encoding="utf-8"?>
-<p:sld xmlns:a="http://schemas.openxmlformats.org/drawingml/2006/main" xmlns:p="http://schemas.openxmlformats.org/presentationml/2006/main" xmlns:r="http://schemas.openxmlformats.org/officeDocument/2006/relationships">
+<p:sld xmlns:a="http://schemas.openxmlformats.org/drawingml/2006/main" xmlns:r="http://schemas.openxmlformats.org/officeDocument/2006/relationships" xmlns:p="http://schemas.openxmlformats.org/presentationml/2006/main">
   <p:cSld>
     <p:spTree>
       <p:nvGrpSpPr>
@@ -3162,7 +3359,14 @@
         <p:cNvGrpSpPr/>
         <p:nvPr/>
       </p:nvGrpSpPr>
-      <p:grpSpPr/>
+      <p:grpSpPr>
+        <a:xfrm>
+          <a:off x="0" y="0"/>
+          <a:ext cx="0" cy="0"/>
+          <a:chOff x="0" y="0"/>
+          <a:chExt cx="0" cy="0"/>
+        </a:xfrm>
+      </p:grpSpPr>
       <p:sp>
         <p:nvSpPr>
           <p:cNvPr id="2" name="Title 1"/>
@@ -3179,8 +3383,10 @@
           <a:lstStyle/>
           <a:p>
             <a:r>
+              <a:rPr dirty="0" err="1"/>
               <a:t>Edad</a:t>
             </a:r>
+            <a:endParaRPr dirty="0"/>
           </a:p>
         </p:txBody>
       </p:sp>
@@ -3198,7 +3404,9 @@
         <p:txBody>
           <a:bodyPr/>
           <a:lstStyle/>
-          <a:p/>
+          <a:p>
+            <a:endParaRPr/>
+          </a:p>
         </p:txBody>
       </p:sp>
       <p:graphicFrame>
@@ -3215,7 +3423,171 @@
         </p:xfrm>
         <a:graphic>
           <a:graphicData uri="http://schemas.openxmlformats.org/drawingml/2006/chart">
-            <c:chart xmlns:c="http://schemas.openxmlformats.org/drawingml/2006/chart" r:id="rId2"/>
+            <c:chart xmlns:c="http://schemas.openxmlformats.org/drawingml/2006/chart" xmlns:r="http://schemas.openxmlformats.org/officeDocument/2006/relationships" r:id="rId2"/>
+          </a:graphicData>
+        </a:graphic>
+      </p:graphicFrame>
+    </p:spTree>
+  </p:cSld>
+  <p:clrMapOvr>
+    <a:masterClrMapping/>
+  </p:clrMapOvr>
+</p:sld>
+</file>
+
+<file path=ppt/slides/slide3.xml><?xml version="1.0" encoding="utf-8"?>
+<p:sld xmlns:a="http://schemas.openxmlformats.org/drawingml/2006/main" xmlns:r="http://schemas.openxmlformats.org/officeDocument/2006/relationships" xmlns:p="http://schemas.openxmlformats.org/presentationml/2006/main">
+  <p:cSld>
+    <p:spTree>
+      <p:nvGrpSpPr>
+        <p:cNvPr id="1" name=""/>
+        <p:cNvGrpSpPr/>
+        <p:nvPr/>
+      </p:nvGrpSpPr>
+      <p:grpSpPr>
+        <a:xfrm>
+          <a:off x="0" y="0"/>
+          <a:ext cx="0" cy="0"/>
+          <a:chOff x="0" y="0"/>
+          <a:chExt cx="0" cy="0"/>
+        </a:xfrm>
+      </p:grpSpPr>
+      <p:sp>
+        <p:nvSpPr>
+          <p:cNvPr id="2" name="Title 1"/>
+          <p:cNvSpPr>
+            <a:spLocks noGrp="1"/>
+          </p:cNvSpPr>
+          <p:nvPr>
+            <p:ph type="title"/>
+          </p:nvPr>
+        </p:nvSpPr>
+        <p:spPr/>
+        <p:txBody>
+          <a:bodyPr/>
+          <a:lstStyle/>
+          <a:p>
+            <a:r>
+              <a:rPr dirty="0"/>
+              <a:t>Si </a:t>
+            </a:r>
+            <a:r>
+              <a:rPr dirty="0" err="1"/>
+              <a:t>presentaste</a:t>
+            </a:r>
+            <a:r>
+              <a:rPr dirty="0"/>
+              <a:t> o </a:t>
+            </a:r>
+            <a:r>
+              <a:rPr dirty="0" err="1"/>
+              <a:t>presentaras</a:t>
+            </a:r>
+            <a:r>
+              <a:rPr dirty="0"/>
+              <a:t> la </a:t>
+            </a:r>
+            <a:r>
+              <a:rPr dirty="0" err="1"/>
+              <a:t>prueba</a:t>
+            </a:r>
+            <a:r>
+              <a:rPr dirty="0"/>
+              <a:t> de </a:t>
+            </a:r>
+            <a:r>
+              <a:rPr dirty="0" err="1"/>
+              <a:t>ingreso</a:t>
+            </a:r>
+            <a:r>
+              <a:rPr dirty="0"/>
+              <a:t> de  UCAB ¿</a:t>
+            </a:r>
+            <a:r>
+              <a:rPr dirty="0" err="1"/>
+              <a:t>cuántas</a:t>
+            </a:r>
+            <a:r>
+              <a:rPr dirty="0"/>
+              <a:t> </a:t>
+            </a:r>
+            <a:r>
+              <a:rPr dirty="0" err="1"/>
+              <a:t>posibilidades</a:t>
+            </a:r>
+            <a:r>
+              <a:rPr dirty="0"/>
+              <a:t> </a:t>
+            </a:r>
+            <a:r>
+              <a:rPr dirty="0" err="1"/>
+              <a:t>crees</a:t>
+            </a:r>
+            <a:r>
+              <a:rPr dirty="0"/>
+              <a:t> que </a:t>
+            </a:r>
+            <a:r>
+              <a:rPr dirty="0" err="1"/>
+              <a:t>tendrías</a:t>
+            </a:r>
+            <a:r>
+              <a:rPr dirty="0"/>
+              <a:t> de </a:t>
+            </a:r>
+            <a:r>
+              <a:rPr dirty="0" err="1"/>
+              <a:t>ser</a:t>
+            </a:r>
+            <a:r>
+              <a:rPr dirty="0"/>
+              <a:t> </a:t>
+            </a:r>
+            <a:r>
+              <a:rPr dirty="0" err="1"/>
+              <a:t>admitido</a:t>
+            </a:r>
+            <a:r>
+              <a:rPr dirty="0"/>
+              <a:t>(a)?</a:t>
+            </a:r>
+          </a:p>
+        </p:txBody>
+      </p:sp>
+      <p:sp>
+        <p:nvSpPr>
+          <p:cNvPr id="3" name="Text Placeholder 2"/>
+          <p:cNvSpPr>
+            <a:spLocks noGrp="1"/>
+          </p:cNvSpPr>
+          <p:nvPr>
+            <p:ph type="body" idx="1"/>
+          </p:nvPr>
+        </p:nvSpPr>
+        <p:spPr/>
+        <p:txBody>
+          <a:bodyPr/>
+          <a:lstStyle/>
+          <a:p>
+            <a:endParaRPr/>
+          </a:p>
+        </p:txBody>
+      </p:sp>
+      <p:graphicFrame>
+        <p:nvGraphicFramePr>
+          <p:cNvPr id="4" name="Chart 3"/>
+          <p:cNvGraphicFramePr>
+            <a:graphicFrameLocks noGrp="1"/>
+          </p:cNvGraphicFramePr>
+          <p:nvPr/>
+        </p:nvGraphicFramePr>
+        <p:xfrm>
+          <a:off x="1828800" y="1828800"/>
+          <a:ext cx="5486400" cy="4114800"/>
+        </p:xfrm>
+        <a:graphic>
+          <a:graphicData uri="http://schemas.openxmlformats.org/drawingml/2006/chart">
+            <c:chart xmlns:c="http://schemas.openxmlformats.org/drawingml/2006/chart" xmlns:r="http://schemas.openxmlformats.org/officeDocument/2006/relationships" r:id="rId2"/>
           </a:graphicData>
         </a:graphic>
       </p:graphicFrame>

</xml_diff>

<commit_message>
2 o mas ediciones
</commit_message>
<xml_diff>
--- a/sistemaaid/backend/ia/presentaciones/pruebapresentaciones.pptx
+++ b/sistemaaid/backend/ia/presentaciones/pruebapresentaciones.pptx
@@ -7,6 +7,10 @@
   <p:sldIdLst>
     <p:sldId id="256" r:id="rId6"/>
     <p:sldId id="257" r:id="rId7"/>
+    <p:sldId id="258" r:id="rId8"/>
+    <p:sldId id="259" r:id="rId9"/>
+    <p:sldId id="260" r:id="rId10"/>
+    <p:sldId id="261" r:id="rId11"/>
   </p:sldIdLst>
   <p:sldSz cx="12192000" cy="6858000"/>
   <p:notesSz cx="6858000" cy="9144000"/>
@@ -129,7 +133,7 @@
               <c:strCache>
                 <c:ptCount val="1"/>
                 <c:pt idx="0">
-                  <c:v>Series 1</c:v>
+                  <c:v>Edición: 99</c:v>
                 </c:pt>
               </c:strCache>
             </c:strRef>
@@ -152,7 +156,736 @@
                 <c:formatCode>General</c:formatCode>
                 <c:ptCount val="1"/>
                 <c:pt idx="0">
-                  <c:v>4</c:v>
+                  <c:v>2</c:v>
+                </c:pt>
+              </c:numCache>
+            </c:numRef>
+          </c:val>
+        </c:ser>
+      </c:pieChart>
+    </c:plotArea>
+    <c:dispBlanksAs val="gap"/>
+  </c:chart>
+  <c:txPr>
+    <a:bodyPr/>
+    <a:lstStyle/>
+    <a:p>
+      <a:pPr>
+        <a:defRPr sz="1800"/>
+      </a:pPr>
+      <a:endParaRPr lang="en-US"/>
+    </a:p>
+  </c:txPr>
+  <c:externalData r:id="rId1">
+    <c:autoUpdate val="0"/>
+  </c:externalData>
+</c:chartSpace>
+</file>
+
+<file path=ppt/charts/chart10.xml><?xml version="1.0" encoding="utf-8"?>
+<c:chartSpace xmlns:c="http://schemas.openxmlformats.org/drawingml/2006/chart" xmlns:a="http://schemas.openxmlformats.org/drawingml/2006/main" xmlns:r="http://schemas.openxmlformats.org/officeDocument/2006/relationships">
+  <c:chart>
+    <c:autoTitleDeleted val="0"/>
+    <c:plotArea>
+      <c:pieChart>
+        <c:varyColors val="1"/>
+        <c:ser>
+          <c:idx val="0"/>
+          <c:order val="0"/>
+          <c:tx>
+            <c:strRef>
+              <c:f>Sheet1!$B$1</c:f>
+              <c:strCache>
+                <c:ptCount val="1"/>
+                <c:pt idx="0">
+                  <c:v>Edición: 101</c:v>
+                </c:pt>
+              </c:strCache>
+            </c:strRef>
+          </c:tx>
+          <c:cat>
+            <c:strRef>
+              <c:f>Sheet1!$A$2:$A$3</c:f>
+              <c:strCache>
+                <c:ptCount val="2"/>
+                <c:pt idx="0">
+                  <c:v>14.0</c:v>
+                </c:pt>
+                <c:pt idx="1">
+                  <c:v>nan</c:v>
+                </c:pt>
+              </c:strCache>
+            </c:strRef>
+          </c:cat>
+          <c:val>
+            <c:numRef>
+              <c:f>Sheet1!$B$2:$B$3</c:f>
+              <c:numCache>
+                <c:formatCode>General</c:formatCode>
+                <c:ptCount val="2"/>
+                <c:pt idx="0">
+                  <c:v>1</c:v>
+                </c:pt>
+                <c:pt idx="1">
+                  <c:v>1</c:v>
+                </c:pt>
+              </c:numCache>
+            </c:numRef>
+          </c:val>
+        </c:ser>
+      </c:pieChart>
+    </c:plotArea>
+    <c:dispBlanksAs val="gap"/>
+  </c:chart>
+  <c:txPr>
+    <a:bodyPr/>
+    <a:lstStyle/>
+    <a:p>
+      <a:pPr>
+        <a:defRPr sz="1800"/>
+      </a:pPr>
+      <a:endParaRPr lang="en-US"/>
+    </a:p>
+  </c:txPr>
+  <c:externalData r:id="rId1">
+    <c:autoUpdate val="0"/>
+  </c:externalData>
+</c:chartSpace>
+</file>
+
+<file path=ppt/charts/chart2.xml><?xml version="1.0" encoding="utf-8"?>
+<c:chartSpace xmlns:c="http://schemas.openxmlformats.org/drawingml/2006/chart" xmlns:a="http://schemas.openxmlformats.org/drawingml/2006/main" xmlns:r="http://schemas.openxmlformats.org/officeDocument/2006/relationships">
+  <c:chart>
+    <c:autoTitleDeleted val="0"/>
+    <c:plotArea>
+      <c:pieChart>
+        <c:varyColors val="1"/>
+        <c:ser>
+          <c:idx val="0"/>
+          <c:order val="0"/>
+          <c:tx>
+            <c:strRef>
+              <c:f>Sheet1!$B$1</c:f>
+              <c:strCache>
+                <c:ptCount val="1"/>
+                <c:pt idx="0">
+                  <c:v>Edición: 101</c:v>
+                </c:pt>
+              </c:strCache>
+            </c:strRef>
+          </c:tx>
+          <c:cat>
+            <c:strRef>
+              <c:f>Sheet1!$A$2:$A$2</c:f>
+              <c:strCache>
+                <c:ptCount val="1"/>
+                <c:pt idx="0">
+                  <c:v>nan</c:v>
+                </c:pt>
+              </c:strCache>
+            </c:strRef>
+          </c:cat>
+          <c:val>
+            <c:numRef>
+              <c:f>Sheet1!$B$2:$B$2</c:f>
+              <c:numCache>
+                <c:formatCode>General</c:formatCode>
+                <c:ptCount val="1"/>
+                <c:pt idx="0">
+                  <c:v>2</c:v>
+                </c:pt>
+              </c:numCache>
+            </c:numRef>
+          </c:val>
+        </c:ser>
+      </c:pieChart>
+    </c:plotArea>
+    <c:dispBlanksAs val="gap"/>
+  </c:chart>
+  <c:txPr>
+    <a:bodyPr/>
+    <a:lstStyle/>
+    <a:p>
+      <a:pPr>
+        <a:defRPr sz="1800"/>
+      </a:pPr>
+      <a:endParaRPr lang="en-US"/>
+    </a:p>
+  </c:txPr>
+  <c:externalData r:id="rId1">
+    <c:autoUpdate val="0"/>
+  </c:externalData>
+</c:chartSpace>
+</file>
+
+<file path=ppt/charts/chart3.xml><?xml version="1.0" encoding="utf-8"?>
+<c:chartSpace xmlns:c="http://schemas.openxmlformats.org/drawingml/2006/chart" xmlns:a="http://schemas.openxmlformats.org/drawingml/2006/main" xmlns:r="http://schemas.openxmlformats.org/officeDocument/2006/relationships">
+  <c:date1904 val="0"/>
+  <c:chart>
+    <c:autoTitleDeleted val="0"/>
+    <c:plotArea>
+      <c:barChart>
+        <c:barDir val="col"/>
+        <c:grouping val="clustered"/>
+        <c:ser>
+          <c:idx val="0"/>
+          <c:order val="0"/>
+          <c:tx>
+            <c:strRef>
+              <c:f>Sheet1!$B$1</c:f>
+              <c:strCache>
+                <c:ptCount val="1"/>
+                <c:pt idx="0">
+                  <c:v>Edición: 99</c:v>
+                </c:pt>
+              </c:strCache>
+            </c:strRef>
+          </c:tx>
+          <c:cat>
+            <c:strRef>
+              <c:f>Sheet1!$A$2:$A$2</c:f>
+              <c:strCache>
+                <c:ptCount val="1"/>
+                <c:pt idx="0">
+                  <c:v>nan</c:v>
+                </c:pt>
+              </c:strCache>
+            </c:strRef>
+          </c:cat>
+          <c:val>
+            <c:numRef>
+              <c:f>Sheet1!$B$2:$B$2</c:f>
+              <c:numCache>
+                <c:formatCode>General</c:formatCode>
+                <c:ptCount val="1"/>
+                <c:pt idx="0">
+                  <c:v>2</c:v>
+                </c:pt>
+              </c:numCache>
+            </c:numRef>
+          </c:val>
+        </c:ser>
+        <c:axId val="-2068027336"/>
+        <c:axId val="-2113994440"/>
+      </c:barChart>
+      <c:catAx>
+        <c:axId val="-2068027336"/>
+        <c:scaling>
+          <c:orientation val="minMax"/>
+        </c:scaling>
+        <c:delete val="0"/>
+        <c:axPos val="b"/>
+        <c:majorTickMark val="out"/>
+        <c:minorTickMark val="none"/>
+        <c:tickLblPos val="nextTo"/>
+        <c:crossAx val="-2113994440"/>
+        <c:crosses val="autoZero"/>
+        <c:auto val="1"/>
+        <c:lblAlgn val="ctr"/>
+        <c:lblOffset val="100"/>
+        <c:noMultiLvlLbl val="0"/>
+      </c:catAx>
+      <c:valAx>
+        <c:axId val="-2113994440"/>
+        <c:scaling/>
+        <c:delete val="0"/>
+        <c:axPos val="l"/>
+        <c:majorGridlines/>
+        <c:majorTickMark val="out"/>
+        <c:minorTickMark val="none"/>
+        <c:tickLblPos val="nextTo"/>
+        <c:crossAx val="-2068027336"/>
+        <c:crosses val="autoZero"/>
+      </c:valAx>
+    </c:plotArea>
+    <c:dispBlanksAs val="gap"/>
+  </c:chart>
+  <c:txPr>
+    <a:bodyPr/>
+    <a:lstStyle/>
+    <a:p>
+      <a:pPr>
+        <a:defRPr sz="1800"/>
+      </a:pPr>
+      <a:endParaRPr lang="en-US"/>
+    </a:p>
+  </c:txPr>
+  <c:externalData r:id="rId1">
+    <c:autoUpdate val="0"/>
+  </c:externalData>
+</c:chartSpace>
+</file>
+
+<file path=ppt/charts/chart4.xml><?xml version="1.0" encoding="utf-8"?>
+<c:chartSpace xmlns:c="http://schemas.openxmlformats.org/drawingml/2006/chart" xmlns:a="http://schemas.openxmlformats.org/drawingml/2006/main" xmlns:r="http://schemas.openxmlformats.org/officeDocument/2006/relationships">
+  <c:date1904 val="0"/>
+  <c:chart>
+    <c:autoTitleDeleted val="0"/>
+    <c:plotArea>
+      <c:barChart>
+        <c:barDir val="col"/>
+        <c:grouping val="clustered"/>
+        <c:ser>
+          <c:idx val="0"/>
+          <c:order val="0"/>
+          <c:tx>
+            <c:strRef>
+              <c:f>Sheet1!$B$1</c:f>
+              <c:strCache>
+                <c:ptCount val="1"/>
+                <c:pt idx="0">
+                  <c:v>Edición: 101</c:v>
+                </c:pt>
+              </c:strCache>
+            </c:strRef>
+          </c:tx>
+          <c:cat>
+            <c:strRef>
+              <c:f>Sheet1!$A$2:$A$2</c:f>
+              <c:strCache>
+                <c:ptCount val="1"/>
+                <c:pt idx="0">
+                  <c:v>nan</c:v>
+                </c:pt>
+              </c:strCache>
+            </c:strRef>
+          </c:cat>
+          <c:val>
+            <c:numRef>
+              <c:f>Sheet1!$B$2:$B$2</c:f>
+              <c:numCache>
+                <c:formatCode>General</c:formatCode>
+                <c:ptCount val="1"/>
+                <c:pt idx="0">
+                  <c:v>2</c:v>
+                </c:pt>
+              </c:numCache>
+            </c:numRef>
+          </c:val>
+        </c:ser>
+        <c:axId val="-2068027336"/>
+        <c:axId val="-2113994440"/>
+      </c:barChart>
+      <c:catAx>
+        <c:axId val="-2068027336"/>
+        <c:scaling>
+          <c:orientation val="minMax"/>
+        </c:scaling>
+        <c:delete val="0"/>
+        <c:axPos val="b"/>
+        <c:majorTickMark val="out"/>
+        <c:minorTickMark val="none"/>
+        <c:tickLblPos val="nextTo"/>
+        <c:crossAx val="-2113994440"/>
+        <c:crosses val="autoZero"/>
+        <c:auto val="1"/>
+        <c:lblAlgn val="ctr"/>
+        <c:lblOffset val="100"/>
+        <c:noMultiLvlLbl val="0"/>
+      </c:catAx>
+      <c:valAx>
+        <c:axId val="-2113994440"/>
+        <c:scaling/>
+        <c:delete val="0"/>
+        <c:axPos val="l"/>
+        <c:majorGridlines/>
+        <c:majorTickMark val="out"/>
+        <c:minorTickMark val="none"/>
+        <c:tickLblPos val="nextTo"/>
+        <c:crossAx val="-2068027336"/>
+        <c:crosses val="autoZero"/>
+      </c:valAx>
+    </c:plotArea>
+    <c:dispBlanksAs val="gap"/>
+  </c:chart>
+  <c:txPr>
+    <a:bodyPr/>
+    <a:lstStyle/>
+    <a:p>
+      <a:pPr>
+        <a:defRPr sz="1800"/>
+      </a:pPr>
+      <a:endParaRPr lang="en-US"/>
+    </a:p>
+  </c:txPr>
+  <c:externalData r:id="rId1">
+    <c:autoUpdate val="0"/>
+  </c:externalData>
+</c:chartSpace>
+</file>
+
+<file path=ppt/charts/chart5.xml><?xml version="1.0" encoding="utf-8"?>
+<c:chartSpace xmlns:c="http://schemas.openxmlformats.org/drawingml/2006/chart" xmlns:a="http://schemas.openxmlformats.org/drawingml/2006/main" xmlns:r="http://schemas.openxmlformats.org/officeDocument/2006/relationships">
+  <c:date1904 val="0"/>
+  <c:chart>
+    <c:autoTitleDeleted val="0"/>
+    <c:plotArea>
+      <c:barChart>
+        <c:barDir val="col"/>
+        <c:grouping val="clustered"/>
+        <c:ser>
+          <c:idx val="0"/>
+          <c:order val="0"/>
+          <c:tx>
+            <c:strRef>
+              <c:f>Sheet1!$B$1</c:f>
+              <c:strCache>
+                <c:ptCount val="1"/>
+                <c:pt idx="0">
+                  <c:v>Edición: 99</c:v>
+                </c:pt>
+              </c:strCache>
+            </c:strRef>
+          </c:tx>
+          <c:cat>
+            <c:strRef>
+              <c:f>Sheet1!$A$2:$A$2</c:f>
+              <c:strCache>
+                <c:ptCount val="1"/>
+                <c:pt idx="0">
+                  <c:v>5</c:v>
+                </c:pt>
+              </c:strCache>
+            </c:strRef>
+          </c:cat>
+          <c:val>
+            <c:numRef>
+              <c:f>Sheet1!$B$2:$B$2</c:f>
+              <c:numCache>
+                <c:formatCode>General</c:formatCode>
+                <c:ptCount val="1"/>
+                <c:pt idx="0">
+                  <c:v>2</c:v>
+                </c:pt>
+              </c:numCache>
+            </c:numRef>
+          </c:val>
+        </c:ser>
+        <c:axId val="-2068027336"/>
+        <c:axId val="-2113994440"/>
+      </c:barChart>
+      <c:catAx>
+        <c:axId val="-2068027336"/>
+        <c:scaling>
+          <c:orientation val="minMax"/>
+        </c:scaling>
+        <c:delete val="0"/>
+        <c:axPos val="b"/>
+        <c:majorTickMark val="out"/>
+        <c:minorTickMark val="none"/>
+        <c:tickLblPos val="nextTo"/>
+        <c:crossAx val="-2113994440"/>
+        <c:crosses val="autoZero"/>
+        <c:auto val="1"/>
+        <c:lblAlgn val="ctr"/>
+        <c:lblOffset val="100"/>
+        <c:noMultiLvlLbl val="0"/>
+      </c:catAx>
+      <c:valAx>
+        <c:axId val="-2113994440"/>
+        <c:scaling/>
+        <c:delete val="0"/>
+        <c:axPos val="l"/>
+        <c:majorGridlines/>
+        <c:majorTickMark val="out"/>
+        <c:minorTickMark val="none"/>
+        <c:tickLblPos val="nextTo"/>
+        <c:crossAx val="-2068027336"/>
+        <c:crosses val="autoZero"/>
+      </c:valAx>
+    </c:plotArea>
+    <c:dispBlanksAs val="gap"/>
+  </c:chart>
+  <c:txPr>
+    <a:bodyPr/>
+    <a:lstStyle/>
+    <a:p>
+      <a:pPr>
+        <a:defRPr sz="1800"/>
+      </a:pPr>
+      <a:endParaRPr lang="en-US"/>
+    </a:p>
+  </c:txPr>
+  <c:externalData r:id="rId1">
+    <c:autoUpdate val="0"/>
+  </c:externalData>
+</c:chartSpace>
+</file>
+
+<file path=ppt/charts/chart6.xml><?xml version="1.0" encoding="utf-8"?>
+<c:chartSpace xmlns:c="http://schemas.openxmlformats.org/drawingml/2006/chart" xmlns:a="http://schemas.openxmlformats.org/drawingml/2006/main" xmlns:r="http://schemas.openxmlformats.org/officeDocument/2006/relationships">
+  <c:date1904 val="0"/>
+  <c:chart>
+    <c:autoTitleDeleted val="0"/>
+    <c:plotArea>
+      <c:barChart>
+        <c:barDir val="col"/>
+        <c:grouping val="clustered"/>
+        <c:ser>
+          <c:idx val="0"/>
+          <c:order val="0"/>
+          <c:tx>
+            <c:strRef>
+              <c:f>Sheet1!$B$1</c:f>
+              <c:strCache>
+                <c:ptCount val="1"/>
+                <c:pt idx="0">
+                  <c:v>Edición: 101</c:v>
+                </c:pt>
+              </c:strCache>
+            </c:strRef>
+          </c:tx>
+          <c:cat>
+            <c:strRef>
+              <c:f>Sheet1!$A$2:$A$2</c:f>
+              <c:strCache>
+                <c:ptCount val="1"/>
+                <c:pt idx="0">
+                  <c:v>5</c:v>
+                </c:pt>
+              </c:strCache>
+            </c:strRef>
+          </c:cat>
+          <c:val>
+            <c:numRef>
+              <c:f>Sheet1!$B$2:$B$2</c:f>
+              <c:numCache>
+                <c:formatCode>General</c:formatCode>
+                <c:ptCount val="1"/>
+                <c:pt idx="0">
+                  <c:v>2</c:v>
+                </c:pt>
+              </c:numCache>
+            </c:numRef>
+          </c:val>
+        </c:ser>
+        <c:axId val="-2068027336"/>
+        <c:axId val="-2113994440"/>
+      </c:barChart>
+      <c:catAx>
+        <c:axId val="-2068027336"/>
+        <c:scaling>
+          <c:orientation val="minMax"/>
+        </c:scaling>
+        <c:delete val="0"/>
+        <c:axPos val="b"/>
+        <c:majorTickMark val="out"/>
+        <c:minorTickMark val="none"/>
+        <c:tickLblPos val="nextTo"/>
+        <c:crossAx val="-2113994440"/>
+        <c:crosses val="autoZero"/>
+        <c:auto val="1"/>
+        <c:lblAlgn val="ctr"/>
+        <c:lblOffset val="100"/>
+        <c:noMultiLvlLbl val="0"/>
+      </c:catAx>
+      <c:valAx>
+        <c:axId val="-2113994440"/>
+        <c:scaling/>
+        <c:delete val="0"/>
+        <c:axPos val="l"/>
+        <c:majorGridlines/>
+        <c:majorTickMark val="out"/>
+        <c:minorTickMark val="none"/>
+        <c:tickLblPos val="nextTo"/>
+        <c:crossAx val="-2068027336"/>
+        <c:crosses val="autoZero"/>
+      </c:valAx>
+    </c:plotArea>
+    <c:dispBlanksAs val="gap"/>
+  </c:chart>
+  <c:txPr>
+    <a:bodyPr/>
+    <a:lstStyle/>
+    <a:p>
+      <a:pPr>
+        <a:defRPr sz="1800"/>
+      </a:pPr>
+      <a:endParaRPr lang="en-US"/>
+    </a:p>
+  </c:txPr>
+  <c:externalData r:id="rId1">
+    <c:autoUpdate val="0"/>
+  </c:externalData>
+</c:chartSpace>
+</file>
+
+<file path=ppt/charts/chart7.xml><?xml version="1.0" encoding="utf-8"?>
+<c:chartSpace xmlns:c="http://schemas.openxmlformats.org/drawingml/2006/chart" xmlns:a="http://schemas.openxmlformats.org/drawingml/2006/main" xmlns:r="http://schemas.openxmlformats.org/officeDocument/2006/relationships">
+  <c:chart>
+    <c:autoTitleDeleted val="0"/>
+    <c:plotArea>
+      <c:pieChart>
+        <c:varyColors val="1"/>
+        <c:ser>
+          <c:idx val="0"/>
+          <c:order val="0"/>
+          <c:tx>
+            <c:strRef>
+              <c:f>Sheet1!$B$1</c:f>
+              <c:strCache>
+                <c:ptCount val="1"/>
+                <c:pt idx="0">
+                  <c:v>Edición: 99</c:v>
+                </c:pt>
+              </c:strCache>
+            </c:strRef>
+          </c:tx>
+          <c:cat>
+            <c:strRef>
+              <c:f>Sheet1!$A$2:$A$2</c:f>
+              <c:strCache>
+                <c:ptCount val="1"/>
+                <c:pt idx="0">
+                  <c:v>nan</c:v>
+                </c:pt>
+              </c:strCache>
+            </c:strRef>
+          </c:cat>
+          <c:val>
+            <c:numRef>
+              <c:f>Sheet1!$B$2:$B$2</c:f>
+              <c:numCache>
+                <c:formatCode>General</c:formatCode>
+                <c:ptCount val="1"/>
+                <c:pt idx="0">
+                  <c:v>2</c:v>
+                </c:pt>
+              </c:numCache>
+            </c:numRef>
+          </c:val>
+        </c:ser>
+      </c:pieChart>
+    </c:plotArea>
+    <c:dispBlanksAs val="gap"/>
+  </c:chart>
+  <c:txPr>
+    <a:bodyPr/>
+    <a:lstStyle/>
+    <a:p>
+      <a:pPr>
+        <a:defRPr sz="1800"/>
+      </a:pPr>
+      <a:endParaRPr lang="en-US"/>
+    </a:p>
+  </c:txPr>
+  <c:externalData r:id="rId1">
+    <c:autoUpdate val="0"/>
+  </c:externalData>
+</c:chartSpace>
+</file>
+
+<file path=ppt/charts/chart8.xml><?xml version="1.0" encoding="utf-8"?>
+<c:chartSpace xmlns:c="http://schemas.openxmlformats.org/drawingml/2006/chart" xmlns:a="http://schemas.openxmlformats.org/drawingml/2006/main" xmlns:r="http://schemas.openxmlformats.org/officeDocument/2006/relationships">
+  <c:chart>
+    <c:autoTitleDeleted val="0"/>
+    <c:plotArea>
+      <c:pieChart>
+        <c:varyColors val="1"/>
+        <c:ser>
+          <c:idx val="0"/>
+          <c:order val="0"/>
+          <c:tx>
+            <c:strRef>
+              <c:f>Sheet1!$B$1</c:f>
+              <c:strCache>
+                <c:ptCount val="1"/>
+                <c:pt idx="0">
+                  <c:v>Edición: 101</c:v>
+                </c:pt>
+              </c:strCache>
+            </c:strRef>
+          </c:tx>
+          <c:cat>
+            <c:strRef>
+              <c:f>Sheet1!$A$2:$A$2</c:f>
+              <c:strCache>
+                <c:ptCount val="1"/>
+                <c:pt idx="0">
+                  <c:v>nan</c:v>
+                </c:pt>
+              </c:strCache>
+            </c:strRef>
+          </c:cat>
+          <c:val>
+            <c:numRef>
+              <c:f>Sheet1!$B$2:$B$2</c:f>
+              <c:numCache>
+                <c:formatCode>General</c:formatCode>
+                <c:ptCount val="1"/>
+                <c:pt idx="0">
+                  <c:v>2</c:v>
+                </c:pt>
+              </c:numCache>
+            </c:numRef>
+          </c:val>
+        </c:ser>
+      </c:pieChart>
+    </c:plotArea>
+    <c:dispBlanksAs val="gap"/>
+  </c:chart>
+  <c:txPr>
+    <a:bodyPr/>
+    <a:lstStyle/>
+    <a:p>
+      <a:pPr>
+        <a:defRPr sz="1800"/>
+      </a:pPr>
+      <a:endParaRPr lang="en-US"/>
+    </a:p>
+  </c:txPr>
+  <c:externalData r:id="rId1">
+    <c:autoUpdate val="0"/>
+  </c:externalData>
+</c:chartSpace>
+</file>
+
+<file path=ppt/charts/chart9.xml><?xml version="1.0" encoding="utf-8"?>
+<c:chartSpace xmlns:c="http://schemas.openxmlformats.org/drawingml/2006/chart" xmlns:a="http://schemas.openxmlformats.org/drawingml/2006/main" xmlns:r="http://schemas.openxmlformats.org/officeDocument/2006/relationships">
+  <c:chart>
+    <c:autoTitleDeleted val="0"/>
+    <c:plotArea>
+      <c:pieChart>
+        <c:varyColors val="1"/>
+        <c:ser>
+          <c:idx val="0"/>
+          <c:order val="0"/>
+          <c:tx>
+            <c:strRef>
+              <c:f>Sheet1!$B$1</c:f>
+              <c:strCache>
+                <c:ptCount val="1"/>
+                <c:pt idx="0">
+                  <c:v>Edición: 99</c:v>
+                </c:pt>
+              </c:strCache>
+            </c:strRef>
+          </c:tx>
+          <c:cat>
+            <c:strRef>
+              <c:f>Sheet1!$A$2:$A$3</c:f>
+              <c:strCache>
+                <c:ptCount val="2"/>
+                <c:pt idx="0">
+                  <c:v>14.0</c:v>
+                </c:pt>
+                <c:pt idx="1">
+                  <c:v>nan</c:v>
+                </c:pt>
+              </c:strCache>
+            </c:strRef>
+          </c:cat>
+          <c:val>
+            <c:numRef>
+              <c:f>Sheet1!$B$2:$B$3</c:f>
+              <c:numCache>
+                <c:formatCode>General</c:formatCode>
+                <c:ptCount val="2"/>
+                <c:pt idx="0">
+                  <c:v>1</c:v>
+                </c:pt>
+                <c:pt idx="1">
+                  <c:v>1</c:v>
                 </c:pt>
               </c:numCache>
             </c:numRef>
@@ -3202,12 +3935,330 @@
           <p:nvPr/>
         </p:nvGraphicFramePr>
         <p:xfrm>
-          <a:off x="3291840" y="1828800"/>
-          <a:ext cx="5486400" cy="4114800"/>
+          <a:off x="6400800" y="2286000"/>
+          <a:ext cx="3657600" cy="3200400"/>
         </p:xfrm>
         <a:graphic>
           <a:graphicData uri="http://schemas.openxmlformats.org/drawingml/2006/chart">
             <c:chart xmlns:c="http://schemas.openxmlformats.org/drawingml/2006/chart" r:id="rId2"/>
+          </a:graphicData>
+        </a:graphic>
+      </p:graphicFrame>
+      <p:graphicFrame>
+        <p:nvGraphicFramePr>
+          <p:cNvPr id="4" name="Chart 3"/>
+          <p:cNvGraphicFramePr>
+            <a:graphicFrameLocks noGrp="1"/>
+          </p:cNvGraphicFramePr>
+          <p:nvPr/>
+        </p:nvGraphicFramePr>
+        <p:xfrm>
+          <a:off x="2286000" y="2286000"/>
+          <a:ext cx="3657600" cy="3200400"/>
+        </p:xfrm>
+        <a:graphic>
+          <a:graphicData uri="http://schemas.openxmlformats.org/drawingml/2006/chart">
+            <c:chart xmlns:c="http://schemas.openxmlformats.org/drawingml/2006/chart" r:id="rId3"/>
+          </a:graphicData>
+        </a:graphic>
+      </p:graphicFrame>
+    </p:spTree>
+  </p:cSld>
+  <p:clrMapOvr>
+    <a:masterClrMapping/>
+  </p:clrMapOvr>
+</p:sld>
+</file>
+
+<file path=ppt/slides/slide3.xml><?xml version="1.0" encoding="utf-8"?>
+<p:sld xmlns:a="http://schemas.openxmlformats.org/drawingml/2006/main" xmlns:p="http://schemas.openxmlformats.org/presentationml/2006/main" xmlns:r="http://schemas.openxmlformats.org/officeDocument/2006/relationships">
+  <p:cSld>
+    <p:spTree>
+      <p:nvGrpSpPr>
+        <p:cNvPr id="1" name=""/>
+        <p:cNvGrpSpPr/>
+        <p:nvPr/>
+      </p:nvGrpSpPr>
+      <p:grpSpPr/>
+      <p:sp>
+        <p:nvSpPr>
+          <p:cNvPr id="2" name="Title 1"/>
+          <p:cNvSpPr>
+            <a:spLocks noGrp="1"/>
+          </p:cNvSpPr>
+          <p:nvPr>
+            <p:ph type="title"/>
+          </p:nvPr>
+        </p:nvSpPr>
+        <p:spPr/>
+        <p:txBody>
+          <a:bodyPr/>
+          <a:lstStyle/>
+          <a:p>
+            <a:r>
+              <a:t>¿Por cuáles medios te has informado sobre Universidades? 7</a:t>
+            </a:r>
+          </a:p>
+        </p:txBody>
+      </p:sp>
+      <p:graphicFrame>
+        <p:nvGraphicFramePr>
+          <p:cNvPr id="3" name="Chart 2"/>
+          <p:cNvGraphicFramePr>
+            <a:graphicFrameLocks noGrp="1"/>
+          </p:cNvGraphicFramePr>
+          <p:nvPr/>
+        </p:nvGraphicFramePr>
+        <p:xfrm>
+          <a:off x="6400800" y="2286000"/>
+          <a:ext cx="3657600" cy="3200400"/>
+        </p:xfrm>
+        <a:graphic>
+          <a:graphicData uri="http://schemas.openxmlformats.org/drawingml/2006/chart">
+            <c:chart xmlns:c="http://schemas.openxmlformats.org/drawingml/2006/chart" r:id="rId2"/>
+          </a:graphicData>
+        </a:graphic>
+      </p:graphicFrame>
+      <p:graphicFrame>
+        <p:nvGraphicFramePr>
+          <p:cNvPr id="4" name="Chart 3"/>
+          <p:cNvGraphicFramePr>
+            <a:graphicFrameLocks noGrp="1"/>
+          </p:cNvGraphicFramePr>
+          <p:nvPr/>
+        </p:nvGraphicFramePr>
+        <p:xfrm>
+          <a:off x="2286000" y="2286000"/>
+          <a:ext cx="3657600" cy="3200400"/>
+        </p:xfrm>
+        <a:graphic>
+          <a:graphicData uri="http://schemas.openxmlformats.org/drawingml/2006/chart">
+            <c:chart xmlns:c="http://schemas.openxmlformats.org/drawingml/2006/chart" r:id="rId3"/>
+          </a:graphicData>
+        </a:graphic>
+      </p:graphicFrame>
+    </p:spTree>
+  </p:cSld>
+  <p:clrMapOvr>
+    <a:masterClrMapping/>
+  </p:clrMapOvr>
+</p:sld>
+</file>
+
+<file path=ppt/slides/slide4.xml><?xml version="1.0" encoding="utf-8"?>
+<p:sld xmlns:a="http://schemas.openxmlformats.org/drawingml/2006/main" xmlns:p="http://schemas.openxmlformats.org/presentationml/2006/main" xmlns:r="http://schemas.openxmlformats.org/officeDocument/2006/relationships">
+  <p:cSld>
+    <p:spTree>
+      <p:nvGrpSpPr>
+        <p:cNvPr id="1" name=""/>
+        <p:cNvGrpSpPr/>
+        <p:nvPr/>
+      </p:nvGrpSpPr>
+      <p:grpSpPr/>
+      <p:sp>
+        <p:nvSpPr>
+          <p:cNvPr id="2" name="Title 1"/>
+          <p:cNvSpPr>
+            <a:spLocks noGrp="1"/>
+          </p:cNvSpPr>
+          <p:nvPr>
+            <p:ph type="title"/>
+          </p:nvPr>
+        </p:nvSpPr>
+        <p:spPr/>
+        <p:txBody>
+          <a:bodyPr/>
+          <a:lstStyle/>
+          <a:p>
+            <a:r>
+              <a:t>Según lo que conoces o has escuchado de la UCAB Graduarse allí no ayuda a  irse del país/Graduarse allí ayuda a irse del país</a:t>
+            </a:r>
+          </a:p>
+        </p:txBody>
+      </p:sp>
+      <p:graphicFrame>
+        <p:nvGraphicFramePr>
+          <p:cNvPr id="3" name="Chart 2"/>
+          <p:cNvGraphicFramePr>
+            <a:graphicFrameLocks noGrp="1"/>
+          </p:cNvGraphicFramePr>
+          <p:nvPr/>
+        </p:nvGraphicFramePr>
+        <p:xfrm>
+          <a:off x="6400800" y="2286000"/>
+          <a:ext cx="3657600" cy="3200400"/>
+        </p:xfrm>
+        <a:graphic>
+          <a:graphicData uri="http://schemas.openxmlformats.org/drawingml/2006/chart">
+            <c:chart xmlns:c="http://schemas.openxmlformats.org/drawingml/2006/chart" r:id="rId2"/>
+          </a:graphicData>
+        </a:graphic>
+      </p:graphicFrame>
+      <p:graphicFrame>
+        <p:nvGraphicFramePr>
+          <p:cNvPr id="4" name="Chart 3"/>
+          <p:cNvGraphicFramePr>
+            <a:graphicFrameLocks noGrp="1"/>
+          </p:cNvGraphicFramePr>
+          <p:nvPr/>
+        </p:nvGraphicFramePr>
+        <p:xfrm>
+          <a:off x="2286000" y="2286000"/>
+          <a:ext cx="3657600" cy="3200400"/>
+        </p:xfrm>
+        <a:graphic>
+          <a:graphicData uri="http://schemas.openxmlformats.org/drawingml/2006/chart">
+            <c:chart xmlns:c="http://schemas.openxmlformats.org/drawingml/2006/chart" r:id="rId3"/>
+          </a:graphicData>
+        </a:graphic>
+      </p:graphicFrame>
+    </p:spTree>
+  </p:cSld>
+  <p:clrMapOvr>
+    <a:masterClrMapping/>
+  </p:clrMapOvr>
+</p:sld>
+</file>
+
+<file path=ppt/slides/slide5.xml><?xml version="1.0" encoding="utf-8"?>
+<p:sld xmlns:a="http://schemas.openxmlformats.org/drawingml/2006/main" xmlns:p="http://schemas.openxmlformats.org/presentationml/2006/main" xmlns:r="http://schemas.openxmlformats.org/officeDocument/2006/relationships">
+  <p:cSld>
+    <p:spTree>
+      <p:nvGrpSpPr>
+        <p:cNvPr id="1" name=""/>
+        <p:cNvGrpSpPr/>
+        <p:nvPr/>
+      </p:nvGrpSpPr>
+      <p:grpSpPr/>
+      <p:sp>
+        <p:nvSpPr>
+          <p:cNvPr id="2" name="Title 1"/>
+          <p:cNvSpPr>
+            <a:spLocks noGrp="1"/>
+          </p:cNvSpPr>
+          <p:nvPr>
+            <p:ph type="title"/>
+          </p:nvPr>
+        </p:nvSpPr>
+        <p:spPr/>
+        <p:txBody>
+          <a:bodyPr/>
+          <a:lstStyle/>
+          <a:p>
+            <a:r>
+              <a:t>BZ Univ 9</a:t>
+            </a:r>
+          </a:p>
+        </p:txBody>
+      </p:sp>
+      <p:graphicFrame>
+        <p:nvGraphicFramePr>
+          <p:cNvPr id="3" name="Chart 2"/>
+          <p:cNvGraphicFramePr>
+            <a:graphicFrameLocks noGrp="1"/>
+          </p:cNvGraphicFramePr>
+          <p:nvPr/>
+        </p:nvGraphicFramePr>
+        <p:xfrm>
+          <a:off x="6400800" y="2286000"/>
+          <a:ext cx="3657600" cy="3200400"/>
+        </p:xfrm>
+        <a:graphic>
+          <a:graphicData uri="http://schemas.openxmlformats.org/drawingml/2006/chart">
+            <c:chart xmlns:c="http://schemas.openxmlformats.org/drawingml/2006/chart" r:id="rId2"/>
+          </a:graphicData>
+        </a:graphic>
+      </p:graphicFrame>
+      <p:graphicFrame>
+        <p:nvGraphicFramePr>
+          <p:cNvPr id="4" name="Chart 3"/>
+          <p:cNvGraphicFramePr>
+            <a:graphicFrameLocks noGrp="1"/>
+          </p:cNvGraphicFramePr>
+          <p:nvPr/>
+        </p:nvGraphicFramePr>
+        <p:xfrm>
+          <a:off x="2286000" y="2286000"/>
+          <a:ext cx="3657600" cy="3200400"/>
+        </p:xfrm>
+        <a:graphic>
+          <a:graphicData uri="http://schemas.openxmlformats.org/drawingml/2006/chart">
+            <c:chart xmlns:c="http://schemas.openxmlformats.org/drawingml/2006/chart" r:id="rId3"/>
+          </a:graphicData>
+        </a:graphic>
+      </p:graphicFrame>
+    </p:spTree>
+  </p:cSld>
+  <p:clrMapOvr>
+    <a:masterClrMapping/>
+  </p:clrMapOvr>
+</p:sld>
+</file>
+
+<file path=ppt/slides/slide6.xml><?xml version="1.0" encoding="utf-8"?>
+<p:sld xmlns:a="http://schemas.openxmlformats.org/drawingml/2006/main" xmlns:p="http://schemas.openxmlformats.org/presentationml/2006/main" xmlns:r="http://schemas.openxmlformats.org/officeDocument/2006/relationships">
+  <p:cSld>
+    <p:spTree>
+      <p:nvGrpSpPr>
+        <p:cNvPr id="1" name=""/>
+        <p:cNvGrpSpPr/>
+        <p:nvPr/>
+      </p:nvGrpSpPr>
+      <p:grpSpPr/>
+      <p:sp>
+        <p:nvSpPr>
+          <p:cNvPr id="2" name="Title 1"/>
+          <p:cNvSpPr>
+            <a:spLocks noGrp="1"/>
+          </p:cNvSpPr>
+          <p:nvPr>
+            <p:ph type="title"/>
+          </p:nvPr>
+        </p:nvSpPr>
+        <p:spPr/>
+        <p:txBody>
+          <a:bodyPr/>
+          <a:lstStyle/>
+          <a:p>
+            <a:r>
+              <a:t>BI Univ 5</a:t>
+            </a:r>
+          </a:p>
+        </p:txBody>
+      </p:sp>
+      <p:graphicFrame>
+        <p:nvGraphicFramePr>
+          <p:cNvPr id="3" name="Chart 2"/>
+          <p:cNvGraphicFramePr>
+            <a:graphicFrameLocks noGrp="1"/>
+          </p:cNvGraphicFramePr>
+          <p:nvPr/>
+        </p:nvGraphicFramePr>
+        <p:xfrm>
+          <a:off x="6400800" y="2286000"/>
+          <a:ext cx="3657600" cy="3200400"/>
+        </p:xfrm>
+        <a:graphic>
+          <a:graphicData uri="http://schemas.openxmlformats.org/drawingml/2006/chart">
+            <c:chart xmlns:c="http://schemas.openxmlformats.org/drawingml/2006/chart" r:id="rId2"/>
+          </a:graphicData>
+        </a:graphic>
+      </p:graphicFrame>
+      <p:graphicFrame>
+        <p:nvGraphicFramePr>
+          <p:cNvPr id="4" name="Chart 3"/>
+          <p:cNvGraphicFramePr>
+            <a:graphicFrameLocks noGrp="1"/>
+          </p:cNvGraphicFramePr>
+          <p:nvPr/>
+        </p:nvGraphicFramePr>
+        <p:xfrm>
+          <a:off x="2286000" y="2286000"/>
+          <a:ext cx="3657600" cy="3200400"/>
+        </p:xfrm>
+        <a:graphic>
+          <a:graphicData uri="http://schemas.openxmlformats.org/drawingml/2006/chart">
+            <c:chart xmlns:c="http://schemas.openxmlformats.org/drawingml/2006/chart" r:id="rId3"/>
           </a:graphicData>
         </a:graphic>
       </p:graphicFrame>

</xml_diff>

<commit_message>
Ajustar tamanos de graficos para una o dos ediciones
</commit_message>
<xml_diff>
--- a/sistemaaid/backend/ia/presentaciones/pruebapresentaciones.pptx
+++ b/sistemaaid/backend/ia/presentaciones/pruebapresentaciones.pptx
@@ -7,11 +7,6 @@
   <p:sldIdLst>
     <p:sldId id="256" r:id="rId6"/>
     <p:sldId id="257" r:id="rId7"/>
-    <p:sldId id="258" r:id="rId8"/>
-    <p:sldId id="259" r:id="rId9"/>
-    <p:sldId id="260" r:id="rId10"/>
-    <p:sldId id="261" r:id="rId11"/>
-    <p:sldId id="262" r:id="rId12"/>
   </p:sldIdLst>
   <p:sldSz cx="12192000" cy="6858000"/>
   <p:notesSz cx="6858000" cy="9144000"/>
@@ -163,263 +158,6 @@
             </c:numRef>
           </c:val>
         </c:ser>
-        <c:dLbls>
-          <c:numFmt formatCode="0%" sourceLinked="0"/>
-          <c:dLblPos val="outEnd"/>
-          <c:showLegendKey val="0"/>
-          <c:showVal val="1"/>
-          <c:showCatName val="0"/>
-          <c:showSerName val="0"/>
-          <c:showPercent val="0"/>
-          <c:showBubbleSize val="0"/>
-          <c:showLeaderLines val="1"/>
-        </c:dLbls>
-      </c:pieChart>
-    </c:plotArea>
-    <c:legend>
-      <c:legendPos val="b"/>
-      <c:overlay val="0"/>
-    </c:legend>
-    <c:dispBlanksAs val="gap"/>
-  </c:chart>
-  <c:txPr>
-    <a:bodyPr/>
-    <a:lstStyle/>
-    <a:p>
-      <a:pPr>
-        <a:defRPr sz="1800"/>
-      </a:pPr>
-      <a:endParaRPr lang="en-US"/>
-    </a:p>
-  </c:txPr>
-  <c:externalData r:id="rId1">
-    <c:autoUpdate val="0"/>
-  </c:externalData>
-</c:chartSpace>
-</file>
-
-<file path=ppt/charts/chart10.xml><?xml version="1.0" encoding="utf-8"?>
-<c:chartSpace xmlns:c="http://schemas.openxmlformats.org/drawingml/2006/chart" xmlns:a="http://schemas.openxmlformats.org/drawingml/2006/main" xmlns:r="http://schemas.openxmlformats.org/officeDocument/2006/relationships">
-  <c:chart>
-    <c:autoTitleDeleted val="0"/>
-    <c:plotArea>
-      <c:pieChart>
-        <c:varyColors val="1"/>
-        <c:ser>
-          <c:idx val="0"/>
-          <c:order val="0"/>
-          <c:tx>
-            <c:strRef>
-              <c:f>Sheet1!$B$1</c:f>
-              <c:strCache>
-                <c:ptCount val="1"/>
-                <c:pt idx="0">
-                  <c:v>Edición: 101</c:v>
-                </c:pt>
-              </c:strCache>
-            </c:strRef>
-          </c:tx>
-          <c:cat>
-            <c:strRef>
-              <c:f>Sheet1!$A$2:$A$3</c:f>
-              <c:strCache>
-                <c:ptCount val="2"/>
-                <c:pt idx="0">
-                  <c:v>14.0</c:v>
-                </c:pt>
-                <c:pt idx="1">
-                  <c:v>nan</c:v>
-                </c:pt>
-              </c:strCache>
-            </c:strRef>
-          </c:cat>
-          <c:val>
-            <c:numRef>
-              <c:f>Sheet1!$B$2:$B$3</c:f>
-              <c:numCache>
-                <c:formatCode>General</c:formatCode>
-                <c:ptCount val="2"/>
-                <c:pt idx="0">
-                  <c:v>1</c:v>
-                </c:pt>
-                <c:pt idx="1">
-                  <c:v>1</c:v>
-                </c:pt>
-              </c:numCache>
-            </c:numRef>
-          </c:val>
-        </c:ser>
-        <c:dLbls>
-          <c:numFmt formatCode="0%" sourceLinked="0"/>
-          <c:dLblPos val="outEnd"/>
-          <c:showLegendKey val="0"/>
-          <c:showVal val="1"/>
-          <c:showCatName val="0"/>
-          <c:showSerName val="0"/>
-          <c:showPercent val="0"/>
-          <c:showBubbleSize val="0"/>
-          <c:showLeaderLines val="1"/>
-        </c:dLbls>
-      </c:pieChart>
-    </c:plotArea>
-    <c:legend>
-      <c:legendPos val="b"/>
-      <c:overlay val="0"/>
-    </c:legend>
-    <c:dispBlanksAs val="gap"/>
-  </c:chart>
-  <c:txPr>
-    <a:bodyPr/>
-    <a:lstStyle/>
-    <a:p>
-      <a:pPr>
-        <a:defRPr sz="1800"/>
-      </a:pPr>
-      <a:endParaRPr lang="en-US"/>
-    </a:p>
-  </c:txPr>
-  <c:externalData r:id="rId1">
-    <c:autoUpdate val="0"/>
-  </c:externalData>
-</c:chartSpace>
-</file>
-
-<file path=ppt/charts/chart11.xml><?xml version="1.0" encoding="utf-8"?>
-<c:chartSpace xmlns:c="http://schemas.openxmlformats.org/drawingml/2006/chart" xmlns:a="http://schemas.openxmlformats.org/drawingml/2006/main" xmlns:r="http://schemas.openxmlformats.org/officeDocument/2006/relationships">
-  <c:chart>
-    <c:autoTitleDeleted val="0"/>
-    <c:plotArea>
-      <c:pieChart>
-        <c:varyColors val="1"/>
-        <c:ser>
-          <c:idx val="0"/>
-          <c:order val="0"/>
-          <c:tx>
-            <c:strRef>
-              <c:f>Sheet1!$B$1</c:f>
-              <c:strCache>
-                <c:ptCount val="1"/>
-                <c:pt idx="0">
-                  <c:v>Edición: 99</c:v>
-                </c:pt>
-              </c:strCache>
-            </c:strRef>
-          </c:tx>
-          <c:cat>
-            <c:strRef>
-              <c:f>Sheet1!$A$2:$A$2</c:f>
-              <c:strCache>
-                <c:ptCount val="1"/>
-                <c:pt idx="0">
-                  <c:v>nan</c:v>
-                </c:pt>
-              </c:strCache>
-            </c:strRef>
-          </c:cat>
-          <c:val>
-            <c:numRef>
-              <c:f>Sheet1!$B$2:$B$2</c:f>
-              <c:numCache>
-                <c:formatCode>General</c:formatCode>
-                <c:ptCount val="1"/>
-                <c:pt idx="0">
-                  <c:v>2</c:v>
-                </c:pt>
-              </c:numCache>
-            </c:numRef>
-          </c:val>
-        </c:ser>
-        <c:dLbls>
-          <c:numFmt formatCode="0%" sourceLinked="0"/>
-          <c:dLblPos val="outEnd"/>
-          <c:showLegendKey val="0"/>
-          <c:showVal val="1"/>
-          <c:showCatName val="0"/>
-          <c:showSerName val="0"/>
-          <c:showPercent val="0"/>
-          <c:showBubbleSize val="0"/>
-          <c:showLeaderLines val="1"/>
-        </c:dLbls>
-      </c:pieChart>
-    </c:plotArea>
-    <c:legend>
-      <c:legendPos val="b"/>
-      <c:overlay val="0"/>
-    </c:legend>
-    <c:dispBlanksAs val="gap"/>
-  </c:chart>
-  <c:txPr>
-    <a:bodyPr/>
-    <a:lstStyle/>
-    <a:p>
-      <a:pPr>
-        <a:defRPr sz="1800"/>
-      </a:pPr>
-      <a:endParaRPr lang="en-US"/>
-    </a:p>
-  </c:txPr>
-  <c:externalData r:id="rId1">
-    <c:autoUpdate val="0"/>
-  </c:externalData>
-</c:chartSpace>
-</file>
-
-<file path=ppt/charts/chart12.xml><?xml version="1.0" encoding="utf-8"?>
-<c:chartSpace xmlns:c="http://schemas.openxmlformats.org/drawingml/2006/chart" xmlns:a="http://schemas.openxmlformats.org/drawingml/2006/main" xmlns:r="http://schemas.openxmlformats.org/officeDocument/2006/relationships">
-  <c:chart>
-    <c:autoTitleDeleted val="0"/>
-    <c:plotArea>
-      <c:pieChart>
-        <c:varyColors val="1"/>
-        <c:ser>
-          <c:idx val="0"/>
-          <c:order val="0"/>
-          <c:tx>
-            <c:strRef>
-              <c:f>Sheet1!$B$1</c:f>
-              <c:strCache>
-                <c:ptCount val="1"/>
-                <c:pt idx="0">
-                  <c:v>Edición: 101</c:v>
-                </c:pt>
-              </c:strCache>
-            </c:strRef>
-          </c:tx>
-          <c:cat>
-            <c:strRef>
-              <c:f>Sheet1!$A$2:$A$2</c:f>
-              <c:strCache>
-                <c:ptCount val="1"/>
-                <c:pt idx="0">
-                  <c:v>nan</c:v>
-                </c:pt>
-              </c:strCache>
-            </c:strRef>
-          </c:cat>
-          <c:val>
-            <c:numRef>
-              <c:f>Sheet1!$B$2:$B$2</c:f>
-              <c:numCache>
-                <c:formatCode>General</c:formatCode>
-                <c:ptCount val="1"/>
-                <c:pt idx="0">
-                  <c:v>2</c:v>
-                </c:pt>
-              </c:numCache>
-            </c:numRef>
-          </c:val>
-        </c:ser>
-        <c:dLbls>
-          <c:numFmt formatCode="0%" sourceLinked="0"/>
-          <c:dLblPos val="outEnd"/>
-          <c:showLegendKey val="0"/>
-          <c:showVal val="1"/>
-          <c:showCatName val="0"/>
-          <c:showSerName val="0"/>
-          <c:showPercent val="0"/>
-          <c:showBubbleSize val="0"/>
-          <c:showLeaderLines val="1"/>
-        </c:dLbls>
       </c:pieChart>
     </c:plotArea>
     <c:legend>
@@ -489,671 +227,6 @@
             </c:numRef>
           </c:val>
         </c:ser>
-        <c:dLbls>
-          <c:numFmt formatCode="0%" sourceLinked="0"/>
-          <c:dLblPos val="outEnd"/>
-          <c:showLegendKey val="0"/>
-          <c:showVal val="1"/>
-          <c:showCatName val="0"/>
-          <c:showSerName val="0"/>
-          <c:showPercent val="0"/>
-          <c:showBubbleSize val="0"/>
-          <c:showLeaderLines val="1"/>
-        </c:dLbls>
-      </c:pieChart>
-    </c:plotArea>
-    <c:legend>
-      <c:legendPos val="b"/>
-      <c:overlay val="0"/>
-    </c:legend>
-    <c:dispBlanksAs val="gap"/>
-  </c:chart>
-  <c:txPr>
-    <a:bodyPr/>
-    <a:lstStyle/>
-    <a:p>
-      <a:pPr>
-        <a:defRPr sz="1800"/>
-      </a:pPr>
-      <a:endParaRPr lang="en-US"/>
-    </a:p>
-  </c:txPr>
-  <c:externalData r:id="rId1">
-    <c:autoUpdate val="0"/>
-  </c:externalData>
-</c:chartSpace>
-</file>
-
-<file path=ppt/charts/chart3.xml><?xml version="1.0" encoding="utf-8"?>
-<c:chartSpace xmlns:c="http://schemas.openxmlformats.org/drawingml/2006/chart" xmlns:a="http://schemas.openxmlformats.org/drawingml/2006/main" xmlns:r="http://schemas.openxmlformats.org/officeDocument/2006/relationships">
-  <c:date1904 val="0"/>
-  <c:chart>
-    <c:autoTitleDeleted val="0"/>
-    <c:plotArea>
-      <c:barChart>
-        <c:barDir val="col"/>
-        <c:grouping val="clustered"/>
-        <c:ser>
-          <c:idx val="0"/>
-          <c:order val="0"/>
-          <c:tx>
-            <c:strRef>
-              <c:f>Sheet1!$B$1</c:f>
-              <c:strCache>
-                <c:ptCount val="1"/>
-                <c:pt idx="0">
-                  <c:v>Edición: 99</c:v>
-                </c:pt>
-              </c:strCache>
-            </c:strRef>
-          </c:tx>
-          <c:cat>
-            <c:strRef>
-              <c:f>Sheet1!$A$2:$A$2</c:f>
-              <c:strCache>
-                <c:ptCount val="1"/>
-                <c:pt idx="0">
-                  <c:v>nan</c:v>
-                </c:pt>
-              </c:strCache>
-            </c:strRef>
-          </c:cat>
-          <c:val>
-            <c:numRef>
-              <c:f>Sheet1!$B$2:$B$2</c:f>
-              <c:numCache>
-                <c:formatCode>General</c:formatCode>
-                <c:ptCount val="1"/>
-                <c:pt idx="0">
-                  <c:v>2</c:v>
-                </c:pt>
-              </c:numCache>
-            </c:numRef>
-          </c:val>
-        </c:ser>
-        <c:axId val="-2068027336"/>
-        <c:axId val="-2113994440"/>
-      </c:barChart>
-      <c:catAx>
-        <c:axId val="-2068027336"/>
-        <c:scaling>
-          <c:orientation val="minMax"/>
-        </c:scaling>
-        <c:delete val="0"/>
-        <c:axPos val="b"/>
-        <c:majorTickMark val="out"/>
-        <c:minorTickMark val="none"/>
-        <c:tickLblPos val="nextTo"/>
-        <c:crossAx val="-2113994440"/>
-        <c:crosses val="autoZero"/>
-        <c:auto val="1"/>
-        <c:lblAlgn val="ctr"/>
-        <c:lblOffset val="100"/>
-        <c:noMultiLvlLbl val="0"/>
-      </c:catAx>
-      <c:valAx>
-        <c:axId val="-2113994440"/>
-        <c:scaling/>
-        <c:delete val="0"/>
-        <c:axPos val="l"/>
-        <c:majorGridlines/>
-        <c:majorTickMark val="out"/>
-        <c:minorTickMark val="none"/>
-        <c:tickLblPos val="nextTo"/>
-        <c:crossAx val="-2068027336"/>
-        <c:crosses val="autoZero"/>
-      </c:valAx>
-    </c:plotArea>
-    <c:legend>
-      <c:legendPos val="b"/>
-      <c:overlay val="0"/>
-    </c:legend>
-    <c:dispBlanksAs val="gap"/>
-  </c:chart>
-  <c:txPr>
-    <a:bodyPr/>
-    <a:lstStyle/>
-    <a:p>
-      <a:pPr>
-        <a:defRPr sz="1800"/>
-      </a:pPr>
-      <a:endParaRPr lang="en-US"/>
-    </a:p>
-  </c:txPr>
-  <c:externalData r:id="rId1">
-    <c:autoUpdate val="0"/>
-  </c:externalData>
-</c:chartSpace>
-</file>
-
-<file path=ppt/charts/chart4.xml><?xml version="1.0" encoding="utf-8"?>
-<c:chartSpace xmlns:c="http://schemas.openxmlformats.org/drawingml/2006/chart" xmlns:a="http://schemas.openxmlformats.org/drawingml/2006/main" xmlns:r="http://schemas.openxmlformats.org/officeDocument/2006/relationships">
-  <c:date1904 val="0"/>
-  <c:chart>
-    <c:autoTitleDeleted val="0"/>
-    <c:plotArea>
-      <c:barChart>
-        <c:barDir val="col"/>
-        <c:grouping val="clustered"/>
-        <c:ser>
-          <c:idx val="0"/>
-          <c:order val="0"/>
-          <c:tx>
-            <c:strRef>
-              <c:f>Sheet1!$B$1</c:f>
-              <c:strCache>
-                <c:ptCount val="1"/>
-                <c:pt idx="0">
-                  <c:v>Edición: 101</c:v>
-                </c:pt>
-              </c:strCache>
-            </c:strRef>
-          </c:tx>
-          <c:cat>
-            <c:strRef>
-              <c:f>Sheet1!$A$2:$A$2</c:f>
-              <c:strCache>
-                <c:ptCount val="1"/>
-                <c:pt idx="0">
-                  <c:v>nan</c:v>
-                </c:pt>
-              </c:strCache>
-            </c:strRef>
-          </c:cat>
-          <c:val>
-            <c:numRef>
-              <c:f>Sheet1!$B$2:$B$2</c:f>
-              <c:numCache>
-                <c:formatCode>General</c:formatCode>
-                <c:ptCount val="1"/>
-                <c:pt idx="0">
-                  <c:v>2</c:v>
-                </c:pt>
-              </c:numCache>
-            </c:numRef>
-          </c:val>
-        </c:ser>
-        <c:axId val="-2068027336"/>
-        <c:axId val="-2113994440"/>
-      </c:barChart>
-      <c:catAx>
-        <c:axId val="-2068027336"/>
-        <c:scaling>
-          <c:orientation val="minMax"/>
-        </c:scaling>
-        <c:delete val="0"/>
-        <c:axPos val="b"/>
-        <c:majorTickMark val="out"/>
-        <c:minorTickMark val="none"/>
-        <c:tickLblPos val="nextTo"/>
-        <c:crossAx val="-2113994440"/>
-        <c:crosses val="autoZero"/>
-        <c:auto val="1"/>
-        <c:lblAlgn val="ctr"/>
-        <c:lblOffset val="100"/>
-        <c:noMultiLvlLbl val="0"/>
-      </c:catAx>
-      <c:valAx>
-        <c:axId val="-2113994440"/>
-        <c:scaling/>
-        <c:delete val="0"/>
-        <c:axPos val="l"/>
-        <c:majorGridlines/>
-        <c:majorTickMark val="out"/>
-        <c:minorTickMark val="none"/>
-        <c:tickLblPos val="nextTo"/>
-        <c:crossAx val="-2068027336"/>
-        <c:crosses val="autoZero"/>
-      </c:valAx>
-    </c:plotArea>
-    <c:legend>
-      <c:legendPos val="b"/>
-      <c:overlay val="0"/>
-    </c:legend>
-    <c:dispBlanksAs val="gap"/>
-  </c:chart>
-  <c:txPr>
-    <a:bodyPr/>
-    <a:lstStyle/>
-    <a:p>
-      <a:pPr>
-        <a:defRPr sz="1800"/>
-      </a:pPr>
-      <a:endParaRPr lang="en-US"/>
-    </a:p>
-  </c:txPr>
-  <c:externalData r:id="rId1">
-    <c:autoUpdate val="0"/>
-  </c:externalData>
-</c:chartSpace>
-</file>
-
-<file path=ppt/charts/chart5.xml><?xml version="1.0" encoding="utf-8"?>
-<c:chartSpace xmlns:c="http://schemas.openxmlformats.org/drawingml/2006/chart" xmlns:a="http://schemas.openxmlformats.org/drawingml/2006/main" xmlns:r="http://schemas.openxmlformats.org/officeDocument/2006/relationships">
-  <c:date1904 val="0"/>
-  <c:chart>
-    <c:autoTitleDeleted val="0"/>
-    <c:plotArea>
-      <c:barChart>
-        <c:barDir val="col"/>
-        <c:grouping val="clustered"/>
-        <c:ser>
-          <c:idx val="0"/>
-          <c:order val="0"/>
-          <c:tx>
-            <c:strRef>
-              <c:f>Sheet1!$B$1</c:f>
-              <c:strCache>
-                <c:ptCount val="1"/>
-                <c:pt idx="0">
-                  <c:v>Edición: 99</c:v>
-                </c:pt>
-              </c:strCache>
-            </c:strRef>
-          </c:tx>
-          <c:cat>
-            <c:strRef>
-              <c:f>Sheet1!$A$2:$A$2</c:f>
-              <c:strCache>
-                <c:ptCount val="1"/>
-                <c:pt idx="0">
-                  <c:v>5</c:v>
-                </c:pt>
-              </c:strCache>
-            </c:strRef>
-          </c:cat>
-          <c:val>
-            <c:numRef>
-              <c:f>Sheet1!$B$2:$B$2</c:f>
-              <c:numCache>
-                <c:formatCode>General</c:formatCode>
-                <c:ptCount val="1"/>
-                <c:pt idx="0">
-                  <c:v>2</c:v>
-                </c:pt>
-              </c:numCache>
-            </c:numRef>
-          </c:val>
-        </c:ser>
-        <c:axId val="-2068027336"/>
-        <c:axId val="-2113994440"/>
-      </c:barChart>
-      <c:catAx>
-        <c:axId val="-2068027336"/>
-        <c:scaling>
-          <c:orientation val="minMax"/>
-        </c:scaling>
-        <c:delete val="0"/>
-        <c:axPos val="b"/>
-        <c:majorTickMark val="out"/>
-        <c:minorTickMark val="none"/>
-        <c:tickLblPos val="nextTo"/>
-        <c:crossAx val="-2113994440"/>
-        <c:crosses val="autoZero"/>
-        <c:auto val="1"/>
-        <c:lblAlgn val="ctr"/>
-        <c:lblOffset val="100"/>
-        <c:noMultiLvlLbl val="0"/>
-      </c:catAx>
-      <c:valAx>
-        <c:axId val="-2113994440"/>
-        <c:scaling/>
-        <c:delete val="0"/>
-        <c:axPos val="l"/>
-        <c:majorGridlines/>
-        <c:majorTickMark val="out"/>
-        <c:minorTickMark val="none"/>
-        <c:tickLblPos val="nextTo"/>
-        <c:crossAx val="-2068027336"/>
-        <c:crosses val="autoZero"/>
-      </c:valAx>
-    </c:plotArea>
-    <c:legend>
-      <c:legendPos val="b"/>
-      <c:overlay val="0"/>
-    </c:legend>
-    <c:dispBlanksAs val="gap"/>
-  </c:chart>
-  <c:txPr>
-    <a:bodyPr/>
-    <a:lstStyle/>
-    <a:p>
-      <a:pPr>
-        <a:defRPr sz="1800"/>
-      </a:pPr>
-      <a:endParaRPr lang="en-US"/>
-    </a:p>
-  </c:txPr>
-  <c:externalData r:id="rId1">
-    <c:autoUpdate val="0"/>
-  </c:externalData>
-</c:chartSpace>
-</file>
-
-<file path=ppt/charts/chart6.xml><?xml version="1.0" encoding="utf-8"?>
-<c:chartSpace xmlns:c="http://schemas.openxmlformats.org/drawingml/2006/chart" xmlns:a="http://schemas.openxmlformats.org/drawingml/2006/main" xmlns:r="http://schemas.openxmlformats.org/officeDocument/2006/relationships">
-  <c:date1904 val="0"/>
-  <c:chart>
-    <c:autoTitleDeleted val="0"/>
-    <c:plotArea>
-      <c:barChart>
-        <c:barDir val="col"/>
-        <c:grouping val="clustered"/>
-        <c:ser>
-          <c:idx val="0"/>
-          <c:order val="0"/>
-          <c:tx>
-            <c:strRef>
-              <c:f>Sheet1!$B$1</c:f>
-              <c:strCache>
-                <c:ptCount val="1"/>
-                <c:pt idx="0">
-                  <c:v>Edición: 101</c:v>
-                </c:pt>
-              </c:strCache>
-            </c:strRef>
-          </c:tx>
-          <c:cat>
-            <c:strRef>
-              <c:f>Sheet1!$A$2:$A$2</c:f>
-              <c:strCache>
-                <c:ptCount val="1"/>
-                <c:pt idx="0">
-                  <c:v>5</c:v>
-                </c:pt>
-              </c:strCache>
-            </c:strRef>
-          </c:cat>
-          <c:val>
-            <c:numRef>
-              <c:f>Sheet1!$B$2:$B$2</c:f>
-              <c:numCache>
-                <c:formatCode>General</c:formatCode>
-                <c:ptCount val="1"/>
-                <c:pt idx="0">
-                  <c:v>2</c:v>
-                </c:pt>
-              </c:numCache>
-            </c:numRef>
-          </c:val>
-        </c:ser>
-        <c:axId val="-2068027336"/>
-        <c:axId val="-2113994440"/>
-      </c:barChart>
-      <c:catAx>
-        <c:axId val="-2068027336"/>
-        <c:scaling>
-          <c:orientation val="minMax"/>
-        </c:scaling>
-        <c:delete val="0"/>
-        <c:axPos val="b"/>
-        <c:majorTickMark val="out"/>
-        <c:minorTickMark val="none"/>
-        <c:tickLblPos val="nextTo"/>
-        <c:crossAx val="-2113994440"/>
-        <c:crosses val="autoZero"/>
-        <c:auto val="1"/>
-        <c:lblAlgn val="ctr"/>
-        <c:lblOffset val="100"/>
-        <c:noMultiLvlLbl val="0"/>
-      </c:catAx>
-      <c:valAx>
-        <c:axId val="-2113994440"/>
-        <c:scaling/>
-        <c:delete val="0"/>
-        <c:axPos val="l"/>
-        <c:majorGridlines/>
-        <c:majorTickMark val="out"/>
-        <c:minorTickMark val="none"/>
-        <c:tickLblPos val="nextTo"/>
-        <c:crossAx val="-2068027336"/>
-        <c:crosses val="autoZero"/>
-      </c:valAx>
-    </c:plotArea>
-    <c:legend>
-      <c:legendPos val="b"/>
-      <c:overlay val="0"/>
-    </c:legend>
-    <c:dispBlanksAs val="gap"/>
-  </c:chart>
-  <c:txPr>
-    <a:bodyPr/>
-    <a:lstStyle/>
-    <a:p>
-      <a:pPr>
-        <a:defRPr sz="1800"/>
-      </a:pPr>
-      <a:endParaRPr lang="en-US"/>
-    </a:p>
-  </c:txPr>
-  <c:externalData r:id="rId1">
-    <c:autoUpdate val="0"/>
-  </c:externalData>
-</c:chartSpace>
-</file>
-
-<file path=ppt/charts/chart7.xml><?xml version="1.0" encoding="utf-8"?>
-<c:chartSpace xmlns:c="http://schemas.openxmlformats.org/drawingml/2006/chart" xmlns:a="http://schemas.openxmlformats.org/drawingml/2006/main" xmlns:r="http://schemas.openxmlformats.org/officeDocument/2006/relationships">
-  <c:chart>
-    <c:autoTitleDeleted val="0"/>
-    <c:plotArea>
-      <c:pieChart>
-        <c:varyColors val="1"/>
-        <c:ser>
-          <c:idx val="0"/>
-          <c:order val="0"/>
-          <c:tx>
-            <c:strRef>
-              <c:f>Sheet1!$B$1</c:f>
-              <c:strCache>
-                <c:ptCount val="1"/>
-                <c:pt idx="0">
-                  <c:v>Edición: 99</c:v>
-                </c:pt>
-              </c:strCache>
-            </c:strRef>
-          </c:tx>
-          <c:cat>
-            <c:strRef>
-              <c:f>Sheet1!$A$2:$A$2</c:f>
-              <c:strCache>
-                <c:ptCount val="1"/>
-                <c:pt idx="0">
-                  <c:v>nan</c:v>
-                </c:pt>
-              </c:strCache>
-            </c:strRef>
-          </c:cat>
-          <c:val>
-            <c:numRef>
-              <c:f>Sheet1!$B$2:$B$2</c:f>
-              <c:numCache>
-                <c:formatCode>General</c:formatCode>
-                <c:ptCount val="1"/>
-                <c:pt idx="0">
-                  <c:v>2</c:v>
-                </c:pt>
-              </c:numCache>
-            </c:numRef>
-          </c:val>
-        </c:ser>
-        <c:dLbls>
-          <c:numFmt formatCode="0%" sourceLinked="0"/>
-          <c:dLblPos val="outEnd"/>
-          <c:showLegendKey val="0"/>
-          <c:showVal val="1"/>
-          <c:showCatName val="0"/>
-          <c:showSerName val="0"/>
-          <c:showPercent val="0"/>
-          <c:showBubbleSize val="0"/>
-          <c:showLeaderLines val="1"/>
-        </c:dLbls>
-      </c:pieChart>
-    </c:plotArea>
-    <c:legend>
-      <c:legendPos val="b"/>
-      <c:overlay val="0"/>
-    </c:legend>
-    <c:dispBlanksAs val="gap"/>
-  </c:chart>
-  <c:txPr>
-    <a:bodyPr/>
-    <a:lstStyle/>
-    <a:p>
-      <a:pPr>
-        <a:defRPr sz="1800"/>
-      </a:pPr>
-      <a:endParaRPr lang="en-US"/>
-    </a:p>
-  </c:txPr>
-  <c:externalData r:id="rId1">
-    <c:autoUpdate val="0"/>
-  </c:externalData>
-</c:chartSpace>
-</file>
-
-<file path=ppt/charts/chart8.xml><?xml version="1.0" encoding="utf-8"?>
-<c:chartSpace xmlns:c="http://schemas.openxmlformats.org/drawingml/2006/chart" xmlns:a="http://schemas.openxmlformats.org/drawingml/2006/main" xmlns:r="http://schemas.openxmlformats.org/officeDocument/2006/relationships">
-  <c:chart>
-    <c:autoTitleDeleted val="0"/>
-    <c:plotArea>
-      <c:pieChart>
-        <c:varyColors val="1"/>
-        <c:ser>
-          <c:idx val="0"/>
-          <c:order val="0"/>
-          <c:tx>
-            <c:strRef>
-              <c:f>Sheet1!$B$1</c:f>
-              <c:strCache>
-                <c:ptCount val="1"/>
-                <c:pt idx="0">
-                  <c:v>Edición: 101</c:v>
-                </c:pt>
-              </c:strCache>
-            </c:strRef>
-          </c:tx>
-          <c:cat>
-            <c:strRef>
-              <c:f>Sheet1!$A$2:$A$2</c:f>
-              <c:strCache>
-                <c:ptCount val="1"/>
-                <c:pt idx="0">
-                  <c:v>nan</c:v>
-                </c:pt>
-              </c:strCache>
-            </c:strRef>
-          </c:cat>
-          <c:val>
-            <c:numRef>
-              <c:f>Sheet1!$B$2:$B$2</c:f>
-              <c:numCache>
-                <c:formatCode>General</c:formatCode>
-                <c:ptCount val="1"/>
-                <c:pt idx="0">
-                  <c:v>2</c:v>
-                </c:pt>
-              </c:numCache>
-            </c:numRef>
-          </c:val>
-        </c:ser>
-        <c:dLbls>
-          <c:numFmt formatCode="0%" sourceLinked="0"/>
-          <c:dLblPos val="outEnd"/>
-          <c:showLegendKey val="0"/>
-          <c:showVal val="1"/>
-          <c:showCatName val="0"/>
-          <c:showSerName val="0"/>
-          <c:showPercent val="0"/>
-          <c:showBubbleSize val="0"/>
-          <c:showLeaderLines val="1"/>
-        </c:dLbls>
-      </c:pieChart>
-    </c:plotArea>
-    <c:legend>
-      <c:legendPos val="b"/>
-      <c:overlay val="0"/>
-    </c:legend>
-    <c:dispBlanksAs val="gap"/>
-  </c:chart>
-  <c:txPr>
-    <a:bodyPr/>
-    <a:lstStyle/>
-    <a:p>
-      <a:pPr>
-        <a:defRPr sz="1800"/>
-      </a:pPr>
-      <a:endParaRPr lang="en-US"/>
-    </a:p>
-  </c:txPr>
-  <c:externalData r:id="rId1">
-    <c:autoUpdate val="0"/>
-  </c:externalData>
-</c:chartSpace>
-</file>
-
-<file path=ppt/charts/chart9.xml><?xml version="1.0" encoding="utf-8"?>
-<c:chartSpace xmlns:c="http://schemas.openxmlformats.org/drawingml/2006/chart" xmlns:a="http://schemas.openxmlformats.org/drawingml/2006/main" xmlns:r="http://schemas.openxmlformats.org/officeDocument/2006/relationships">
-  <c:chart>
-    <c:autoTitleDeleted val="0"/>
-    <c:plotArea>
-      <c:pieChart>
-        <c:varyColors val="1"/>
-        <c:ser>
-          <c:idx val="0"/>
-          <c:order val="0"/>
-          <c:tx>
-            <c:strRef>
-              <c:f>Sheet1!$B$1</c:f>
-              <c:strCache>
-                <c:ptCount val="1"/>
-                <c:pt idx="0">
-                  <c:v>Edición: 99</c:v>
-                </c:pt>
-              </c:strCache>
-            </c:strRef>
-          </c:tx>
-          <c:cat>
-            <c:strRef>
-              <c:f>Sheet1!$A$2:$A$3</c:f>
-              <c:strCache>
-                <c:ptCount val="2"/>
-                <c:pt idx="0">
-                  <c:v>14.0</c:v>
-                </c:pt>
-                <c:pt idx="1">
-                  <c:v>nan</c:v>
-                </c:pt>
-              </c:strCache>
-            </c:strRef>
-          </c:cat>
-          <c:val>
-            <c:numRef>
-              <c:f>Sheet1!$B$2:$B$3</c:f>
-              <c:numCache>
-                <c:formatCode>General</c:formatCode>
-                <c:ptCount val="2"/>
-                <c:pt idx="0">
-                  <c:v>1</c:v>
-                </c:pt>
-                <c:pt idx="1">
-                  <c:v>1</c:v>
-                </c:pt>
-              </c:numCache>
-            </c:numRef>
-          </c:val>
-        </c:ser>
-        <c:dLbls>
-          <c:numFmt formatCode="0%" sourceLinked="0"/>
-          <c:dLblPos val="outEnd"/>
-          <c:showLegendKey val="0"/>
-          <c:showVal val="1"/>
-          <c:showCatName val="0"/>
-          <c:showSerName val="0"/>
-          <c:showPercent val="0"/>
-          <c:showBubbleSize val="0"/>
-          <c:showLeaderLines val="1"/>
-        </c:dLbls>
       </c:pieChart>
     </c:plotArea>
     <c:legend>
@@ -4149,7 +3222,7 @@
               <a:defRPr sz="1400"/>
             </a:pPr>
             <a:r>
-              <a:t>Fecha: 19-09-2022</a:t>
+              <a:t>Fecha: 21-09-2022</a:t>
             </a:r>
           </a:p>
         </p:txBody>
@@ -4188,382 +3261,7 @@
           <a:lstStyle/>
           <a:p>
             <a:r>
-              <a:t>¿Por cuáles medios te has informado sobre Universidades? 7</a:t>
-            </a:r>
-          </a:p>
-        </p:txBody>
-      </p:sp>
-      <p:graphicFrame>
-        <p:nvGraphicFramePr>
-          <p:cNvPr id="3" name="Chart 2"/>
-          <p:cNvGraphicFramePr>
-            <a:graphicFrameLocks noGrp="1"/>
-          </p:cNvGraphicFramePr>
-          <p:nvPr/>
-        </p:nvGraphicFramePr>
-        <p:xfrm>
-          <a:off x="6400800" y="2286000"/>
-          <a:ext cx="3657600" cy="3200400"/>
-        </p:xfrm>
-        <a:graphic>
-          <a:graphicData uri="http://schemas.openxmlformats.org/drawingml/2006/chart">
-            <c:chart xmlns:c="http://schemas.openxmlformats.org/drawingml/2006/chart" r:id="rId2"/>
-          </a:graphicData>
-        </a:graphic>
-      </p:graphicFrame>
-      <p:graphicFrame>
-        <p:nvGraphicFramePr>
-          <p:cNvPr id="4" name="Chart 3"/>
-          <p:cNvGraphicFramePr>
-            <a:graphicFrameLocks noGrp="1"/>
-          </p:cNvGraphicFramePr>
-          <p:nvPr/>
-        </p:nvGraphicFramePr>
-        <p:xfrm>
-          <a:off x="2286000" y="2286000"/>
-          <a:ext cx="3657600" cy="3200400"/>
-        </p:xfrm>
-        <a:graphic>
-          <a:graphicData uri="http://schemas.openxmlformats.org/drawingml/2006/chart">
-            <c:chart xmlns:c="http://schemas.openxmlformats.org/drawingml/2006/chart" r:id="rId3"/>
-          </a:graphicData>
-        </a:graphic>
-      </p:graphicFrame>
-    </p:spTree>
-  </p:cSld>
-  <p:clrMapOvr>
-    <a:masterClrMapping/>
-  </p:clrMapOvr>
-</p:sld>
-</file>
-
-<file path=ppt/slides/slide3.xml><?xml version="1.0" encoding="utf-8"?>
-<p:sld xmlns:a="http://schemas.openxmlformats.org/drawingml/2006/main" xmlns:p="http://schemas.openxmlformats.org/presentationml/2006/main" xmlns:r="http://schemas.openxmlformats.org/officeDocument/2006/relationships">
-  <p:cSld>
-    <p:spTree>
-      <p:nvGrpSpPr>
-        <p:cNvPr id="1" name=""/>
-        <p:cNvGrpSpPr/>
-        <p:nvPr/>
-      </p:nvGrpSpPr>
-      <p:grpSpPr/>
-      <p:sp>
-        <p:nvSpPr>
-          <p:cNvPr id="2" name="Title 1"/>
-          <p:cNvSpPr>
-            <a:spLocks noGrp="1"/>
-          </p:cNvSpPr>
-          <p:nvPr>
-            <p:ph type="title"/>
-          </p:nvPr>
-        </p:nvSpPr>
-        <p:spPr/>
-        <p:txBody>
-          <a:bodyPr/>
-          <a:lstStyle/>
-          <a:p>
-            <a:r>
-              <a:t>¿Por cuáles medios te has informado sobre Universidades? 7</a:t>
-            </a:r>
-          </a:p>
-        </p:txBody>
-      </p:sp>
-      <p:graphicFrame>
-        <p:nvGraphicFramePr>
-          <p:cNvPr id="3" name="Chart 2"/>
-          <p:cNvGraphicFramePr>
-            <a:graphicFrameLocks noGrp="1"/>
-          </p:cNvGraphicFramePr>
-          <p:nvPr/>
-        </p:nvGraphicFramePr>
-        <p:xfrm>
-          <a:off x="6400800" y="2286000"/>
-          <a:ext cx="3657600" cy="3200400"/>
-        </p:xfrm>
-        <a:graphic>
-          <a:graphicData uri="http://schemas.openxmlformats.org/drawingml/2006/chart">
-            <c:chart xmlns:c="http://schemas.openxmlformats.org/drawingml/2006/chart" r:id="rId2"/>
-          </a:graphicData>
-        </a:graphic>
-      </p:graphicFrame>
-      <p:graphicFrame>
-        <p:nvGraphicFramePr>
-          <p:cNvPr id="4" name="Chart 3"/>
-          <p:cNvGraphicFramePr>
-            <a:graphicFrameLocks noGrp="1"/>
-          </p:cNvGraphicFramePr>
-          <p:nvPr/>
-        </p:nvGraphicFramePr>
-        <p:xfrm>
-          <a:off x="2286000" y="2286000"/>
-          <a:ext cx="3657600" cy="3200400"/>
-        </p:xfrm>
-        <a:graphic>
-          <a:graphicData uri="http://schemas.openxmlformats.org/drawingml/2006/chart">
-            <c:chart xmlns:c="http://schemas.openxmlformats.org/drawingml/2006/chart" r:id="rId3"/>
-          </a:graphicData>
-        </a:graphic>
-      </p:graphicFrame>
-    </p:spTree>
-  </p:cSld>
-  <p:clrMapOvr>
-    <a:masterClrMapping/>
-  </p:clrMapOvr>
-</p:sld>
-</file>
-
-<file path=ppt/slides/slide4.xml><?xml version="1.0" encoding="utf-8"?>
-<p:sld xmlns:a="http://schemas.openxmlformats.org/drawingml/2006/main" xmlns:p="http://schemas.openxmlformats.org/presentationml/2006/main" xmlns:r="http://schemas.openxmlformats.org/officeDocument/2006/relationships">
-  <p:cSld>
-    <p:spTree>
-      <p:nvGrpSpPr>
-        <p:cNvPr id="1" name=""/>
-        <p:cNvGrpSpPr/>
-        <p:nvPr/>
-      </p:nvGrpSpPr>
-      <p:grpSpPr/>
-      <p:sp>
-        <p:nvSpPr>
-          <p:cNvPr id="2" name="Title 1"/>
-          <p:cNvSpPr>
-            <a:spLocks noGrp="1"/>
-          </p:cNvSpPr>
-          <p:nvPr>
-            <p:ph type="title"/>
-          </p:nvPr>
-        </p:nvSpPr>
-        <p:spPr/>
-        <p:txBody>
-          <a:bodyPr/>
-          <a:lstStyle/>
-          <a:p>
-            <a:r>
-              <a:t>Según lo que conoces o has escuchado de la UCAB Graduarse allí no ayuda a  irse del país/Graduarse allí ayuda a irse del país</a:t>
-            </a:r>
-          </a:p>
-        </p:txBody>
-      </p:sp>
-      <p:graphicFrame>
-        <p:nvGraphicFramePr>
-          <p:cNvPr id="3" name="Chart 2"/>
-          <p:cNvGraphicFramePr>
-            <a:graphicFrameLocks noGrp="1"/>
-          </p:cNvGraphicFramePr>
-          <p:nvPr/>
-        </p:nvGraphicFramePr>
-        <p:xfrm>
-          <a:off x="6400800" y="2286000"/>
-          <a:ext cx="3657600" cy="3200400"/>
-        </p:xfrm>
-        <a:graphic>
-          <a:graphicData uri="http://schemas.openxmlformats.org/drawingml/2006/chart">
-            <c:chart xmlns:c="http://schemas.openxmlformats.org/drawingml/2006/chart" r:id="rId2"/>
-          </a:graphicData>
-        </a:graphic>
-      </p:graphicFrame>
-      <p:graphicFrame>
-        <p:nvGraphicFramePr>
-          <p:cNvPr id="4" name="Chart 3"/>
-          <p:cNvGraphicFramePr>
-            <a:graphicFrameLocks noGrp="1"/>
-          </p:cNvGraphicFramePr>
-          <p:nvPr/>
-        </p:nvGraphicFramePr>
-        <p:xfrm>
-          <a:off x="2286000" y="2286000"/>
-          <a:ext cx="3657600" cy="3200400"/>
-        </p:xfrm>
-        <a:graphic>
-          <a:graphicData uri="http://schemas.openxmlformats.org/drawingml/2006/chart">
-            <c:chart xmlns:c="http://schemas.openxmlformats.org/drawingml/2006/chart" r:id="rId3"/>
-          </a:graphicData>
-        </a:graphic>
-      </p:graphicFrame>
-    </p:spTree>
-  </p:cSld>
-  <p:clrMapOvr>
-    <a:masterClrMapping/>
-  </p:clrMapOvr>
-</p:sld>
-</file>
-
-<file path=ppt/slides/slide5.xml><?xml version="1.0" encoding="utf-8"?>
-<p:sld xmlns:a="http://schemas.openxmlformats.org/drawingml/2006/main" xmlns:p="http://schemas.openxmlformats.org/presentationml/2006/main" xmlns:r="http://schemas.openxmlformats.org/officeDocument/2006/relationships">
-  <p:cSld>
-    <p:spTree>
-      <p:nvGrpSpPr>
-        <p:cNvPr id="1" name=""/>
-        <p:cNvGrpSpPr/>
-        <p:nvPr/>
-      </p:nvGrpSpPr>
-      <p:grpSpPr/>
-      <p:sp>
-        <p:nvSpPr>
-          <p:cNvPr id="2" name="Title 1"/>
-          <p:cNvSpPr>
-            <a:spLocks noGrp="1"/>
-          </p:cNvSpPr>
-          <p:nvPr>
-            <p:ph type="title"/>
-          </p:nvPr>
-        </p:nvSpPr>
-        <p:spPr/>
-        <p:txBody>
-          <a:bodyPr/>
-          <a:lstStyle/>
-          <a:p>
-            <a:r>
-              <a:t>BZ Univ 9</a:t>
-            </a:r>
-          </a:p>
-        </p:txBody>
-      </p:sp>
-      <p:graphicFrame>
-        <p:nvGraphicFramePr>
-          <p:cNvPr id="3" name="Chart 2"/>
-          <p:cNvGraphicFramePr>
-            <a:graphicFrameLocks noGrp="1"/>
-          </p:cNvGraphicFramePr>
-          <p:nvPr/>
-        </p:nvGraphicFramePr>
-        <p:xfrm>
-          <a:off x="6400800" y="2286000"/>
-          <a:ext cx="3657600" cy="3200400"/>
-        </p:xfrm>
-        <a:graphic>
-          <a:graphicData uri="http://schemas.openxmlformats.org/drawingml/2006/chart">
-            <c:chart xmlns:c="http://schemas.openxmlformats.org/drawingml/2006/chart" r:id="rId2"/>
-          </a:graphicData>
-        </a:graphic>
-      </p:graphicFrame>
-      <p:graphicFrame>
-        <p:nvGraphicFramePr>
-          <p:cNvPr id="4" name="Chart 3"/>
-          <p:cNvGraphicFramePr>
-            <a:graphicFrameLocks noGrp="1"/>
-          </p:cNvGraphicFramePr>
-          <p:nvPr/>
-        </p:nvGraphicFramePr>
-        <p:xfrm>
-          <a:off x="2286000" y="2286000"/>
-          <a:ext cx="3657600" cy="3200400"/>
-        </p:xfrm>
-        <a:graphic>
-          <a:graphicData uri="http://schemas.openxmlformats.org/drawingml/2006/chart">
-            <c:chart xmlns:c="http://schemas.openxmlformats.org/drawingml/2006/chart" r:id="rId3"/>
-          </a:graphicData>
-        </a:graphic>
-      </p:graphicFrame>
-    </p:spTree>
-  </p:cSld>
-  <p:clrMapOvr>
-    <a:masterClrMapping/>
-  </p:clrMapOvr>
-</p:sld>
-</file>
-
-<file path=ppt/slides/slide6.xml><?xml version="1.0" encoding="utf-8"?>
-<p:sld xmlns:a="http://schemas.openxmlformats.org/drawingml/2006/main" xmlns:p="http://schemas.openxmlformats.org/presentationml/2006/main" xmlns:r="http://schemas.openxmlformats.org/officeDocument/2006/relationships">
-  <p:cSld>
-    <p:spTree>
-      <p:nvGrpSpPr>
-        <p:cNvPr id="1" name=""/>
-        <p:cNvGrpSpPr/>
-        <p:nvPr/>
-      </p:nvGrpSpPr>
-      <p:grpSpPr/>
-      <p:sp>
-        <p:nvSpPr>
-          <p:cNvPr id="2" name="Title 1"/>
-          <p:cNvSpPr>
-            <a:spLocks noGrp="1"/>
-          </p:cNvSpPr>
-          <p:nvPr>
-            <p:ph type="title"/>
-          </p:nvPr>
-        </p:nvSpPr>
-        <p:spPr/>
-        <p:txBody>
-          <a:bodyPr/>
-          <a:lstStyle/>
-          <a:p>
-            <a:r>
-              <a:t>BI Univ 5</a:t>
-            </a:r>
-          </a:p>
-        </p:txBody>
-      </p:sp>
-      <p:graphicFrame>
-        <p:nvGraphicFramePr>
-          <p:cNvPr id="3" name="Chart 2"/>
-          <p:cNvGraphicFramePr>
-            <a:graphicFrameLocks noGrp="1"/>
-          </p:cNvGraphicFramePr>
-          <p:nvPr/>
-        </p:nvGraphicFramePr>
-        <p:xfrm>
-          <a:off x="6400800" y="2286000"/>
-          <a:ext cx="3657600" cy="3200400"/>
-        </p:xfrm>
-        <a:graphic>
-          <a:graphicData uri="http://schemas.openxmlformats.org/drawingml/2006/chart">
-            <c:chart xmlns:c="http://schemas.openxmlformats.org/drawingml/2006/chart" r:id="rId2"/>
-          </a:graphicData>
-        </a:graphic>
-      </p:graphicFrame>
-      <p:graphicFrame>
-        <p:nvGraphicFramePr>
-          <p:cNvPr id="4" name="Chart 3"/>
-          <p:cNvGraphicFramePr>
-            <a:graphicFrameLocks noGrp="1"/>
-          </p:cNvGraphicFramePr>
-          <p:nvPr/>
-        </p:nvGraphicFramePr>
-        <p:xfrm>
-          <a:off x="2286000" y="2286000"/>
-          <a:ext cx="3657600" cy="3200400"/>
-        </p:xfrm>
-        <a:graphic>
-          <a:graphicData uri="http://schemas.openxmlformats.org/drawingml/2006/chart">
-            <c:chart xmlns:c="http://schemas.openxmlformats.org/drawingml/2006/chart" r:id="rId3"/>
-          </a:graphicData>
-        </a:graphic>
-      </p:graphicFrame>
-    </p:spTree>
-  </p:cSld>
-  <p:clrMapOvr>
-    <a:masterClrMapping/>
-  </p:clrMapOvr>
-</p:sld>
-</file>
-
-<file path=ppt/slides/slide7.xml><?xml version="1.0" encoding="utf-8"?>
-<p:sld xmlns:a="http://schemas.openxmlformats.org/drawingml/2006/main" xmlns:p="http://schemas.openxmlformats.org/presentationml/2006/main" xmlns:r="http://schemas.openxmlformats.org/officeDocument/2006/relationships">
-  <p:cSld>
-    <p:spTree>
-      <p:nvGrpSpPr>
-        <p:cNvPr id="1" name=""/>
-        <p:cNvGrpSpPr/>
-        <p:nvPr/>
-      </p:nvGrpSpPr>
-      <p:grpSpPr/>
-      <p:sp>
-        <p:nvSpPr>
-          <p:cNvPr id="2" name="Title 1"/>
-          <p:cNvSpPr>
-            <a:spLocks noGrp="1"/>
-          </p:cNvSpPr>
-          <p:nvPr>
-            <p:ph type="title"/>
-          </p:nvPr>
-        </p:nvSpPr>
-        <p:spPr/>
-        <p:txBody>
-          <a:bodyPr/>
-          <a:lstStyle/>
-          <a:p>
-            <a:r>
-              <a:t>O Univ 10</a:t>
+              <a:t>I Univ 4</a:t>
             </a:r>
           </a:p>
         </p:txBody>

</xml_diff>

<commit_message>
Cambios hasta árboles dentro de la aplicación
</commit_message>
<xml_diff>
--- a/sistemaaid/backend/ia/presentaciones/pruebapresentaciones.pptx
+++ b/sistemaaid/backend/ia/presentaciones/pruebapresentaciones.pptx
@@ -115,11 +115,13 @@
 
 <file path=ppt/charts/chart1.xml><?xml version="1.0" encoding="utf-8"?>
 <c:chartSpace xmlns:c="http://schemas.openxmlformats.org/drawingml/2006/chart" xmlns:a="http://schemas.openxmlformats.org/drawingml/2006/main" xmlns:r="http://schemas.openxmlformats.org/officeDocument/2006/relationships">
+  <c:date1904 val="0"/>
   <c:chart>
     <c:autoTitleDeleted val="0"/>
     <c:plotArea>
-      <c:pieChart>
-        <c:varyColors val="1"/>
+      <c:barChart>
+        <c:barDir val="col"/>
+        <c:grouping val="clustered"/>
         <c:ser>
           <c:idx val="0"/>
           <c:order val="0"/>
@@ -129,7 +131,7 @@
               <c:strCache>
                 <c:ptCount val="1"/>
                 <c:pt idx="0">
-                  <c:v>Edición: 99</c:v>
+                  <c:v>Edición: MON25</c:v>
                 </c:pt>
               </c:strCache>
             </c:strRef>
@@ -152,82 +154,44 @@
                 <c:formatCode>General</c:formatCode>
                 <c:ptCount val="1"/>
                 <c:pt idx="0">
-                  <c:v>2</c:v>
+                  <c:v>141</c:v>
                 </c:pt>
               </c:numCache>
             </c:numRef>
           </c:val>
         </c:ser>
-      </c:pieChart>
-    </c:plotArea>
-    <c:legend>
-      <c:legendPos val="b"/>
-      <c:overlay val="0"/>
-    </c:legend>
-    <c:dispBlanksAs val="gap"/>
-  </c:chart>
-  <c:txPr>
-    <a:bodyPr/>
-    <a:lstStyle/>
-    <a:p>
-      <a:pPr>
-        <a:defRPr sz="1800"/>
-      </a:pPr>
-      <a:endParaRPr lang="en-US"/>
-    </a:p>
-  </c:txPr>
-  <c:externalData r:id="rId1">
-    <c:autoUpdate val="0"/>
-  </c:externalData>
-</c:chartSpace>
-</file>
-
-<file path=ppt/charts/chart2.xml><?xml version="1.0" encoding="utf-8"?>
-<c:chartSpace xmlns:c="http://schemas.openxmlformats.org/drawingml/2006/chart" xmlns:a="http://schemas.openxmlformats.org/drawingml/2006/main" xmlns:r="http://schemas.openxmlformats.org/officeDocument/2006/relationships">
-  <c:chart>
-    <c:autoTitleDeleted val="0"/>
-    <c:plotArea>
-      <c:pieChart>
-        <c:varyColors val="1"/>
-        <c:ser>
-          <c:idx val="0"/>
-          <c:order val="0"/>
-          <c:tx>
-            <c:strRef>
-              <c:f>Sheet1!$B$1</c:f>
-              <c:strCache>
-                <c:ptCount val="1"/>
-                <c:pt idx="0">
-                  <c:v>Edición: 101</c:v>
-                </c:pt>
-              </c:strCache>
-            </c:strRef>
-          </c:tx>
-          <c:cat>
-            <c:strRef>
-              <c:f>Sheet1!$A$2:$A$2</c:f>
-              <c:strCache>
-                <c:ptCount val="1"/>
-                <c:pt idx="0">
-                  <c:v>nan</c:v>
-                </c:pt>
-              </c:strCache>
-            </c:strRef>
-          </c:cat>
-          <c:val>
-            <c:numRef>
-              <c:f>Sheet1!$B$2:$B$2</c:f>
-              <c:numCache>
-                <c:formatCode>General</c:formatCode>
-                <c:ptCount val="1"/>
-                <c:pt idx="0">
-                  <c:v>2</c:v>
-                </c:pt>
-              </c:numCache>
-            </c:numRef>
-          </c:val>
-        </c:ser>
-      </c:pieChart>
+        <c:axId val="-2068027336"/>
+        <c:axId val="-2113994440"/>
+      </c:barChart>
+      <c:catAx>
+        <c:axId val="-2068027336"/>
+        <c:scaling>
+          <c:orientation val="minMax"/>
+        </c:scaling>
+        <c:delete val="0"/>
+        <c:axPos val="b"/>
+        <c:majorTickMark val="out"/>
+        <c:minorTickMark val="none"/>
+        <c:tickLblPos val="nextTo"/>
+        <c:crossAx val="-2113994440"/>
+        <c:crosses val="autoZero"/>
+        <c:auto val="1"/>
+        <c:lblAlgn val="ctr"/>
+        <c:lblOffset val="100"/>
+        <c:noMultiLvlLbl val="0"/>
+      </c:catAx>
+      <c:valAx>
+        <c:axId val="-2113994440"/>
+        <c:scaling/>
+        <c:delete val="0"/>
+        <c:axPos val="l"/>
+        <c:majorGridlines/>
+        <c:majorTickMark val="out"/>
+        <c:minorTickMark val="none"/>
+        <c:tickLblPos val="nextTo"/>
+        <c:crossAx val="-2068027336"/>
+        <c:crosses val="autoZero"/>
+      </c:valAx>
     </c:plotArea>
     <c:legend>
       <c:legendPos val="b"/>
@@ -3145,7 +3109,7 @@
           <a:lstStyle/>
           <a:p>
             <a:r>
-              <a:t>Reporte de estudio Lunes - 99</a:t>
+              <a:t>Reporte de estudio MONITOR PRUEBA 2019 - DEF1</a:t>
             </a:r>
           </a:p>
         </p:txBody>
@@ -3166,7 +3130,7 @@
           <a:lstStyle/>
           <a:p>
             <a:r>
-              <a:t>Ediciones: 99, 101</a:t>
+              <a:t>Ediciones: MON25</a:t>
             </a:r>
           </a:p>
         </p:txBody>
@@ -3222,7 +3186,7 @@
               <a:defRPr sz="1400"/>
             </a:pPr>
             <a:r>
-              <a:t>Fecha: 21-09-2022</a:t>
+              <a:t>Fecha: 04-10-2022</a:t>
             </a:r>
           </a:p>
         </p:txBody>
@@ -3261,7 +3225,7 @@
           <a:lstStyle/>
           <a:p>
             <a:r>
-              <a:t>I Univ 4</a:t>
+              <a:t>Son malas para estudiar en línea 2</a:t>
             </a:r>
           </a:p>
         </p:txBody>
@@ -3293,7 +3257,7 @@
               <a:defRPr sz="1400"/>
             </a:pPr>
             <a:r>
-              <a:t>Este texto indica que quiere decir la diapositiva</a:t>
+              <a:t>prueba</a:t>
             </a:r>
           </a:p>
         </p:txBody>
@@ -3307,30 +3271,12 @@
           <p:nvPr/>
         </p:nvGraphicFramePr>
         <p:xfrm>
-          <a:off x="6400800" y="1828800"/>
-          <a:ext cx="3657600" cy="3200400"/>
+          <a:off x="3657600" y="1828800"/>
+          <a:ext cx="4572000" cy="3291840"/>
         </p:xfrm>
         <a:graphic>
           <a:graphicData uri="http://schemas.openxmlformats.org/drawingml/2006/chart">
             <c:chart xmlns:c="http://schemas.openxmlformats.org/drawingml/2006/chart" r:id="rId2"/>
-          </a:graphicData>
-        </a:graphic>
-      </p:graphicFrame>
-      <p:graphicFrame>
-        <p:nvGraphicFramePr>
-          <p:cNvPr id="5" name="Chart 4"/>
-          <p:cNvGraphicFramePr>
-            <a:graphicFrameLocks noGrp="1"/>
-          </p:cNvGraphicFramePr>
-          <p:nvPr/>
-        </p:nvGraphicFramePr>
-        <p:xfrm>
-          <a:off x="2286000" y="1828800"/>
-          <a:ext cx="3657600" cy="3200400"/>
-        </p:xfrm>
-        <a:graphic>
-          <a:graphicData uri="http://schemas.openxmlformats.org/drawingml/2006/chart">
-            <c:chart xmlns:c="http://schemas.openxmlformats.org/drawingml/2006/chart" r:id="rId3"/>
           </a:graphicData>
         </a:graphic>
       </p:graphicFrame>

</xml_diff>